<commit_message>
Add 1st CI slide
</commit_message>
<xml_diff>
--- a/Bootcamp-ContinuousDelivery.pptx
+++ b/Bootcamp-ContinuousDelivery.pptx
@@ -1085,13 +1085,6 @@
         </dgm:presLayoutVars>
       </dgm:prSet>
       <dgm:spPr/>
-      <dgm:t>
-        <a:bodyPr/>
-        <a:lstStyle/>
-        <a:p>
-          <a:endParaRPr lang="en-US"/>
-        </a:p>
-      </dgm:t>
     </dgm:pt>
     <dgm:pt modelId="{FC542BF3-5C1C-42C5-B5E5-6321BB8EB7F9}" type="pres">
       <dgm:prSet presAssocID="{C66579FF-178F-4EB3-A619-EB6244DBF190}" presName="node" presStyleLbl="node1" presStyleIdx="0" presStyleCnt="5">
@@ -1100,35 +1093,14 @@
         </dgm:presLayoutVars>
       </dgm:prSet>
       <dgm:spPr/>
-      <dgm:t>
-        <a:bodyPr/>
-        <a:lstStyle/>
-        <a:p>
-          <a:endParaRPr lang="en-US"/>
-        </a:p>
-      </dgm:t>
     </dgm:pt>
     <dgm:pt modelId="{FA7B59B5-FC02-4344-AC79-BB949A239074}" type="pres">
       <dgm:prSet presAssocID="{9CDC3CEF-BEFB-4641-BD78-1C7053AE5D85}" presName="sibTrans" presStyleLbl="sibTrans2D1" presStyleIdx="0" presStyleCnt="5"/>
       <dgm:spPr/>
-      <dgm:t>
-        <a:bodyPr/>
-        <a:lstStyle/>
-        <a:p>
-          <a:endParaRPr lang="en-US"/>
-        </a:p>
-      </dgm:t>
     </dgm:pt>
     <dgm:pt modelId="{A70BC138-62CC-44F9-9D81-A0D94D618821}" type="pres">
       <dgm:prSet presAssocID="{9CDC3CEF-BEFB-4641-BD78-1C7053AE5D85}" presName="connectorText" presStyleLbl="sibTrans2D1" presStyleIdx="0" presStyleCnt="5"/>
       <dgm:spPr/>
-      <dgm:t>
-        <a:bodyPr/>
-        <a:lstStyle/>
-        <a:p>
-          <a:endParaRPr lang="en-US"/>
-        </a:p>
-      </dgm:t>
     </dgm:pt>
     <dgm:pt modelId="{26E82A5F-C42E-46BE-BC85-BF125D7B11DF}" type="pres">
       <dgm:prSet presAssocID="{2C8B1AAE-4F3F-4ECF-9149-8D0B38858342}" presName="node" presStyleLbl="node1" presStyleIdx="1" presStyleCnt="5">
@@ -1137,35 +1109,14 @@
         </dgm:presLayoutVars>
       </dgm:prSet>
       <dgm:spPr/>
-      <dgm:t>
-        <a:bodyPr/>
-        <a:lstStyle/>
-        <a:p>
-          <a:endParaRPr lang="en-US"/>
-        </a:p>
-      </dgm:t>
     </dgm:pt>
     <dgm:pt modelId="{3872CCD2-0516-45C4-AD48-9C6A7CA90B7D}" type="pres">
       <dgm:prSet presAssocID="{42FEEE84-07F4-4179-9CF4-34A821DA5FE7}" presName="sibTrans" presStyleLbl="sibTrans2D1" presStyleIdx="1" presStyleCnt="5"/>
       <dgm:spPr/>
-      <dgm:t>
-        <a:bodyPr/>
-        <a:lstStyle/>
-        <a:p>
-          <a:endParaRPr lang="en-US"/>
-        </a:p>
-      </dgm:t>
     </dgm:pt>
     <dgm:pt modelId="{36AA703D-7D87-4520-ADB7-200A3B1C3073}" type="pres">
       <dgm:prSet presAssocID="{42FEEE84-07F4-4179-9CF4-34A821DA5FE7}" presName="connectorText" presStyleLbl="sibTrans2D1" presStyleIdx="1" presStyleCnt="5"/>
       <dgm:spPr/>
-      <dgm:t>
-        <a:bodyPr/>
-        <a:lstStyle/>
-        <a:p>
-          <a:endParaRPr lang="en-US"/>
-        </a:p>
-      </dgm:t>
     </dgm:pt>
     <dgm:pt modelId="{573E983B-764A-4772-B1A2-F269F4179211}" type="pres">
       <dgm:prSet presAssocID="{C5569C4E-117B-44A4-A5C3-2514A629D92D}" presName="node" presStyleLbl="node1" presStyleIdx="2" presStyleCnt="5">
@@ -1174,35 +1125,14 @@
         </dgm:presLayoutVars>
       </dgm:prSet>
       <dgm:spPr/>
-      <dgm:t>
-        <a:bodyPr/>
-        <a:lstStyle/>
-        <a:p>
-          <a:endParaRPr lang="en-US"/>
-        </a:p>
-      </dgm:t>
     </dgm:pt>
     <dgm:pt modelId="{8778FFBA-6EAF-4AE4-9CDD-8111001477BA}" type="pres">
       <dgm:prSet presAssocID="{B9A8C14C-2FA3-4AD2-B689-F8EC4AC3E915}" presName="sibTrans" presStyleLbl="sibTrans2D1" presStyleIdx="2" presStyleCnt="5"/>
       <dgm:spPr/>
-      <dgm:t>
-        <a:bodyPr/>
-        <a:lstStyle/>
-        <a:p>
-          <a:endParaRPr lang="en-US"/>
-        </a:p>
-      </dgm:t>
     </dgm:pt>
     <dgm:pt modelId="{CDD0D33F-26A1-4611-A42E-7467613F6B93}" type="pres">
       <dgm:prSet presAssocID="{B9A8C14C-2FA3-4AD2-B689-F8EC4AC3E915}" presName="connectorText" presStyleLbl="sibTrans2D1" presStyleIdx="2" presStyleCnt="5"/>
       <dgm:spPr/>
-      <dgm:t>
-        <a:bodyPr/>
-        <a:lstStyle/>
-        <a:p>
-          <a:endParaRPr lang="en-US"/>
-        </a:p>
-      </dgm:t>
     </dgm:pt>
     <dgm:pt modelId="{FFE636CC-1D68-4F03-9766-767ACA791844}" type="pres">
       <dgm:prSet presAssocID="{B04ABEBF-BF63-467B-9B88-F60E6947C5A0}" presName="node" presStyleLbl="node1" presStyleIdx="3" presStyleCnt="5">
@@ -1211,35 +1141,14 @@
         </dgm:presLayoutVars>
       </dgm:prSet>
       <dgm:spPr/>
-      <dgm:t>
-        <a:bodyPr/>
-        <a:lstStyle/>
-        <a:p>
-          <a:endParaRPr lang="en-US"/>
-        </a:p>
-      </dgm:t>
     </dgm:pt>
     <dgm:pt modelId="{7C4001D0-B375-4EC6-B48A-30B7EF199C1D}" type="pres">
       <dgm:prSet presAssocID="{DC418283-A530-43EC-8A1C-46857DA00D49}" presName="sibTrans" presStyleLbl="sibTrans2D1" presStyleIdx="3" presStyleCnt="5"/>
       <dgm:spPr/>
-      <dgm:t>
-        <a:bodyPr/>
-        <a:lstStyle/>
-        <a:p>
-          <a:endParaRPr lang="en-US"/>
-        </a:p>
-      </dgm:t>
     </dgm:pt>
     <dgm:pt modelId="{0B7F95E8-029B-4078-A29A-04C184A53BC1}" type="pres">
       <dgm:prSet presAssocID="{DC418283-A530-43EC-8A1C-46857DA00D49}" presName="connectorText" presStyleLbl="sibTrans2D1" presStyleIdx="3" presStyleCnt="5"/>
       <dgm:spPr/>
-      <dgm:t>
-        <a:bodyPr/>
-        <a:lstStyle/>
-        <a:p>
-          <a:endParaRPr lang="en-US"/>
-        </a:p>
-      </dgm:t>
     </dgm:pt>
     <dgm:pt modelId="{7F83799A-03F8-4762-8C61-0C4EB7BC8AE0}" type="pres">
       <dgm:prSet presAssocID="{DCBB36FC-F725-433E-8305-D4586A98D64E}" presName="node" presStyleLbl="node1" presStyleIdx="4" presStyleCnt="5">
@@ -1248,59 +1157,38 @@
         </dgm:presLayoutVars>
       </dgm:prSet>
       <dgm:spPr/>
-      <dgm:t>
-        <a:bodyPr/>
-        <a:lstStyle/>
-        <a:p>
-          <a:endParaRPr lang="en-US"/>
-        </a:p>
-      </dgm:t>
     </dgm:pt>
     <dgm:pt modelId="{051F7C30-9F90-4A4C-BF5D-5FFA9564171A}" type="pres">
       <dgm:prSet presAssocID="{F428EFD7-7586-4CF0-BEE0-9BE2754D41A4}" presName="sibTrans" presStyleLbl="sibTrans2D1" presStyleIdx="4" presStyleCnt="5"/>
       <dgm:spPr/>
-      <dgm:t>
-        <a:bodyPr/>
-        <a:lstStyle/>
-        <a:p>
-          <a:endParaRPr lang="en-US"/>
-        </a:p>
-      </dgm:t>
     </dgm:pt>
     <dgm:pt modelId="{67D912B2-D21C-4181-936F-8DD7A0047903}" type="pres">
       <dgm:prSet presAssocID="{F428EFD7-7586-4CF0-BEE0-9BE2754D41A4}" presName="connectorText" presStyleLbl="sibTrans2D1" presStyleIdx="4" presStyleCnt="5"/>
       <dgm:spPr/>
-      <dgm:t>
-        <a:bodyPr/>
-        <a:lstStyle/>
-        <a:p>
-          <a:endParaRPr lang="en-US"/>
-        </a:p>
-      </dgm:t>
     </dgm:pt>
   </dgm:ptLst>
   <dgm:cxnLst>
-    <dgm:cxn modelId="{50F1D490-FE37-4A89-9D15-17F721E90C0A}" srcId="{88072AEC-04DF-449A-B70B-4F458BD9276A}" destId="{2C8B1AAE-4F3F-4ECF-9149-8D0B38858342}" srcOrd="1" destOrd="0" parTransId="{99B51D7F-9A01-46F8-9643-9FA051F00F32}" sibTransId="{42FEEE84-07F4-4179-9CF4-34A821DA5FE7}"/>
-    <dgm:cxn modelId="{F32B0D7C-741E-49C1-8C51-A981ED96746C}" type="presOf" srcId="{DC418283-A530-43EC-8A1C-46857DA00D49}" destId="{0B7F95E8-029B-4078-A29A-04C184A53BC1}" srcOrd="1" destOrd="0" presId="urn:microsoft.com/office/officeart/2005/8/layout/cycle2"/>
+    <dgm:cxn modelId="{FCC6AA0E-B4DA-43E0-96F5-5D9A12F95753}" type="presOf" srcId="{2C8B1AAE-4F3F-4ECF-9149-8D0B38858342}" destId="{26E82A5F-C42E-46BE-BC85-BF125D7B11DF}" srcOrd="0" destOrd="0" presId="urn:microsoft.com/office/officeart/2005/8/layout/cycle2"/>
+    <dgm:cxn modelId="{975C7129-EF52-4A06-93E6-C7E4062DBDE0}" type="presOf" srcId="{42FEEE84-07F4-4179-9CF4-34A821DA5FE7}" destId="{3872CCD2-0516-45C4-AD48-9C6A7CA90B7D}" srcOrd="0" destOrd="0" presId="urn:microsoft.com/office/officeart/2005/8/layout/cycle2"/>
+    <dgm:cxn modelId="{9665205D-660F-4DE5-AA56-6642D4251254}" type="presOf" srcId="{9CDC3CEF-BEFB-4641-BD78-1C7053AE5D85}" destId="{A70BC138-62CC-44F9-9D81-A0D94D618821}" srcOrd="1" destOrd="0" presId="urn:microsoft.com/office/officeart/2005/8/layout/cycle2"/>
+    <dgm:cxn modelId="{85D7E867-EA90-46FD-B64E-E4843F1A4F29}" type="presOf" srcId="{88072AEC-04DF-449A-B70B-4F458BD9276A}" destId="{0CF3F3A6-A8C0-4943-BFC3-EE75978EB55C}" srcOrd="0" destOrd="0" presId="urn:microsoft.com/office/officeart/2005/8/layout/cycle2"/>
+    <dgm:cxn modelId="{57208A68-EDA3-4C02-A071-C6627F705981}" srcId="{88072AEC-04DF-449A-B70B-4F458BD9276A}" destId="{B04ABEBF-BF63-467B-9B88-F60E6947C5A0}" srcOrd="3" destOrd="0" parTransId="{AD9E29E4-47E5-485C-BE8C-3F14FB393D03}" sibTransId="{DC418283-A530-43EC-8A1C-46857DA00D49}"/>
+    <dgm:cxn modelId="{B3F9896B-9FF0-40A9-9C69-5E91E241EADD}" type="presOf" srcId="{DC418283-A530-43EC-8A1C-46857DA00D49}" destId="{7C4001D0-B375-4EC6-B48A-30B7EF199C1D}" srcOrd="0" destOrd="0" presId="urn:microsoft.com/office/officeart/2005/8/layout/cycle2"/>
     <dgm:cxn modelId="{27C7396C-2F0F-4444-AC76-A8D9A6E0F367}" type="presOf" srcId="{B04ABEBF-BF63-467B-9B88-F60E6947C5A0}" destId="{FFE636CC-1D68-4F03-9766-767ACA791844}" srcOrd="0" destOrd="0" presId="urn:microsoft.com/office/officeart/2005/8/layout/cycle2"/>
-    <dgm:cxn modelId="{9665205D-660F-4DE5-AA56-6642D4251254}" type="presOf" srcId="{9CDC3CEF-BEFB-4641-BD78-1C7053AE5D85}" destId="{A70BC138-62CC-44F9-9D81-A0D94D618821}" srcOrd="1" destOrd="0" presId="urn:microsoft.com/office/officeart/2005/8/layout/cycle2"/>
-    <dgm:cxn modelId="{F6C087BB-7F68-4771-8139-16DADB8C62C9}" type="presOf" srcId="{9CDC3CEF-BEFB-4641-BD78-1C7053AE5D85}" destId="{FA7B59B5-FC02-4344-AC79-BB949A239074}" srcOrd="0" destOrd="0" presId="urn:microsoft.com/office/officeart/2005/8/layout/cycle2"/>
-    <dgm:cxn modelId="{975C7129-EF52-4A06-93E6-C7E4062DBDE0}" type="presOf" srcId="{42FEEE84-07F4-4179-9CF4-34A821DA5FE7}" destId="{3872CCD2-0516-45C4-AD48-9C6A7CA90B7D}" srcOrd="0" destOrd="0" presId="urn:microsoft.com/office/officeart/2005/8/layout/cycle2"/>
-    <dgm:cxn modelId="{344D5C57-22DF-445A-92CE-3BFD21DB1C86}" type="presOf" srcId="{F428EFD7-7586-4CF0-BEE0-9BE2754D41A4}" destId="{051F7C30-9F90-4A4C-BF5D-5FFA9564171A}" srcOrd="0" destOrd="0" presId="urn:microsoft.com/office/officeart/2005/8/layout/cycle2"/>
-    <dgm:cxn modelId="{6ABD4C55-7352-420A-AF8E-D9849FF588AA}" type="presOf" srcId="{F428EFD7-7586-4CF0-BEE0-9BE2754D41A4}" destId="{67D912B2-D21C-4181-936F-8DD7A0047903}" srcOrd="1" destOrd="0" presId="urn:microsoft.com/office/officeart/2005/8/layout/cycle2"/>
-    <dgm:cxn modelId="{A0A04899-E0B7-4F95-8C62-37E9DCC41685}" type="presOf" srcId="{DCBB36FC-F725-433E-8305-D4586A98D64E}" destId="{7F83799A-03F8-4762-8C61-0C4EB7BC8AE0}" srcOrd="0" destOrd="0" presId="urn:microsoft.com/office/officeart/2005/8/layout/cycle2"/>
+    <dgm:cxn modelId="{FCF98070-D19E-4156-9833-35294DF17073}" type="presOf" srcId="{B9A8C14C-2FA3-4AD2-B689-F8EC4AC3E915}" destId="{8778FFBA-6EAF-4AE4-9CDD-8111001477BA}" srcOrd="0" destOrd="0" presId="urn:microsoft.com/office/officeart/2005/8/layout/cycle2"/>
     <dgm:cxn modelId="{515C8151-BB14-4869-891A-5AB9603FCEE3}" type="presOf" srcId="{42FEEE84-07F4-4179-9CF4-34A821DA5FE7}" destId="{36AA703D-7D87-4520-ADB7-200A3B1C3073}" srcOrd="1" destOrd="0" presId="urn:microsoft.com/office/officeart/2005/8/layout/cycle2"/>
     <dgm:cxn modelId="{6581E753-1CB6-469C-AD26-3EF3FCD614AE}" type="presOf" srcId="{B9A8C14C-2FA3-4AD2-B689-F8EC4AC3E915}" destId="{CDD0D33F-26A1-4611-A42E-7467613F6B93}" srcOrd="1" destOrd="0" presId="urn:microsoft.com/office/officeart/2005/8/layout/cycle2"/>
+    <dgm:cxn modelId="{6ABD4C55-7352-420A-AF8E-D9849FF588AA}" type="presOf" srcId="{F428EFD7-7586-4CF0-BEE0-9BE2754D41A4}" destId="{67D912B2-D21C-4181-936F-8DD7A0047903}" srcOrd="1" destOrd="0" presId="urn:microsoft.com/office/officeart/2005/8/layout/cycle2"/>
+    <dgm:cxn modelId="{344D5C57-22DF-445A-92CE-3BFD21DB1C86}" type="presOf" srcId="{F428EFD7-7586-4CF0-BEE0-9BE2754D41A4}" destId="{051F7C30-9F90-4A4C-BF5D-5FFA9564171A}" srcOrd="0" destOrd="0" presId="urn:microsoft.com/office/officeart/2005/8/layout/cycle2"/>
+    <dgm:cxn modelId="{F32B0D7C-741E-49C1-8C51-A981ED96746C}" type="presOf" srcId="{DC418283-A530-43EC-8A1C-46857DA00D49}" destId="{0B7F95E8-029B-4078-A29A-04C184A53BC1}" srcOrd="1" destOrd="0" presId="urn:microsoft.com/office/officeart/2005/8/layout/cycle2"/>
+    <dgm:cxn modelId="{72EAAC8A-FA76-41AC-AF30-8141E160D38E}" srcId="{88072AEC-04DF-449A-B70B-4F458BD9276A}" destId="{C66579FF-178F-4EB3-A619-EB6244DBF190}" srcOrd="0" destOrd="0" parTransId="{5C95DE5E-2979-4625-A5C4-E94DD6ECBA0A}" sibTransId="{9CDC3CEF-BEFB-4641-BD78-1C7053AE5D85}"/>
+    <dgm:cxn modelId="{50F1D490-FE37-4A89-9D15-17F721E90C0A}" srcId="{88072AEC-04DF-449A-B70B-4F458BD9276A}" destId="{2C8B1AAE-4F3F-4ECF-9149-8D0B38858342}" srcOrd="1" destOrd="0" parTransId="{99B51D7F-9A01-46F8-9643-9FA051F00F32}" sibTransId="{42FEEE84-07F4-4179-9CF4-34A821DA5FE7}"/>
+    <dgm:cxn modelId="{A0A04899-E0B7-4F95-8C62-37E9DCC41685}" type="presOf" srcId="{DCBB36FC-F725-433E-8305-D4586A98D64E}" destId="{7F83799A-03F8-4762-8C61-0C4EB7BC8AE0}" srcOrd="0" destOrd="0" presId="urn:microsoft.com/office/officeart/2005/8/layout/cycle2"/>
+    <dgm:cxn modelId="{F6C087BB-7F68-4771-8139-16DADB8C62C9}" type="presOf" srcId="{9CDC3CEF-BEFB-4641-BD78-1C7053AE5D85}" destId="{FA7B59B5-FC02-4344-AC79-BB949A239074}" srcOrd="0" destOrd="0" presId="urn:microsoft.com/office/officeart/2005/8/layout/cycle2"/>
     <dgm:cxn modelId="{AAB963BE-FED9-4C21-ACDD-A39DE0813FC0}" type="presOf" srcId="{C66579FF-178F-4EB3-A619-EB6244DBF190}" destId="{FC542BF3-5C1C-42C5-B5E5-6321BB8EB7F9}" srcOrd="0" destOrd="0" presId="urn:microsoft.com/office/officeart/2005/8/layout/cycle2"/>
+    <dgm:cxn modelId="{DD1E91D7-9C29-488E-B038-681D9E576D89}" type="presOf" srcId="{C5569C4E-117B-44A4-A5C3-2514A629D92D}" destId="{573E983B-764A-4772-B1A2-F269F4179211}" srcOrd="0" destOrd="0" presId="urn:microsoft.com/office/officeart/2005/8/layout/cycle2"/>
     <dgm:cxn modelId="{1DA041DE-23CE-41A5-AE48-9F58EA68B919}" srcId="{88072AEC-04DF-449A-B70B-4F458BD9276A}" destId="{C5569C4E-117B-44A4-A5C3-2514A629D92D}" srcOrd="2" destOrd="0" parTransId="{4022B1F5-8577-4801-8EFE-BB302604F7E3}" sibTransId="{B9A8C14C-2FA3-4AD2-B689-F8EC4AC3E915}"/>
-    <dgm:cxn modelId="{72EAAC8A-FA76-41AC-AF30-8141E160D38E}" srcId="{88072AEC-04DF-449A-B70B-4F458BD9276A}" destId="{C66579FF-178F-4EB3-A619-EB6244DBF190}" srcOrd="0" destOrd="0" parTransId="{5C95DE5E-2979-4625-A5C4-E94DD6ECBA0A}" sibTransId="{9CDC3CEF-BEFB-4641-BD78-1C7053AE5D85}"/>
-    <dgm:cxn modelId="{57208A68-EDA3-4C02-A071-C6627F705981}" srcId="{88072AEC-04DF-449A-B70B-4F458BD9276A}" destId="{B04ABEBF-BF63-467B-9B88-F60E6947C5A0}" srcOrd="3" destOrd="0" parTransId="{AD9E29E4-47E5-485C-BE8C-3F14FB393D03}" sibTransId="{DC418283-A530-43EC-8A1C-46857DA00D49}"/>
-    <dgm:cxn modelId="{85D7E867-EA90-46FD-B64E-E4843F1A4F29}" type="presOf" srcId="{88072AEC-04DF-449A-B70B-4F458BD9276A}" destId="{0CF3F3A6-A8C0-4943-BFC3-EE75978EB55C}" srcOrd="0" destOrd="0" presId="urn:microsoft.com/office/officeart/2005/8/layout/cycle2"/>
     <dgm:cxn modelId="{1D4C2EE6-F1BA-48EB-A562-A98A1429BF3B}" srcId="{88072AEC-04DF-449A-B70B-4F458BD9276A}" destId="{DCBB36FC-F725-433E-8305-D4586A98D64E}" srcOrd="4" destOrd="0" parTransId="{118A1B07-4471-43C8-A265-3FDB6015B904}" sibTransId="{F428EFD7-7586-4CF0-BEE0-9BE2754D41A4}"/>
-    <dgm:cxn modelId="{FCF98070-D19E-4156-9833-35294DF17073}" type="presOf" srcId="{B9A8C14C-2FA3-4AD2-B689-F8EC4AC3E915}" destId="{8778FFBA-6EAF-4AE4-9CDD-8111001477BA}" srcOrd="0" destOrd="0" presId="urn:microsoft.com/office/officeart/2005/8/layout/cycle2"/>
-    <dgm:cxn modelId="{DD1E91D7-9C29-488E-B038-681D9E576D89}" type="presOf" srcId="{C5569C4E-117B-44A4-A5C3-2514A629D92D}" destId="{573E983B-764A-4772-B1A2-F269F4179211}" srcOrd="0" destOrd="0" presId="urn:microsoft.com/office/officeart/2005/8/layout/cycle2"/>
-    <dgm:cxn modelId="{FCC6AA0E-B4DA-43E0-96F5-5D9A12F95753}" type="presOf" srcId="{2C8B1AAE-4F3F-4ECF-9149-8D0B38858342}" destId="{26E82A5F-C42E-46BE-BC85-BF125D7B11DF}" srcOrd="0" destOrd="0" presId="urn:microsoft.com/office/officeart/2005/8/layout/cycle2"/>
-    <dgm:cxn modelId="{B3F9896B-9FF0-40A9-9C69-5E91E241EADD}" type="presOf" srcId="{DC418283-A530-43EC-8A1C-46857DA00D49}" destId="{7C4001D0-B375-4EC6-B48A-30B7EF199C1D}" srcOrd="0" destOrd="0" presId="urn:microsoft.com/office/officeart/2005/8/layout/cycle2"/>
     <dgm:cxn modelId="{C7473F77-F1AC-41FE-B508-061A8A1E6F5D}" type="presParOf" srcId="{0CF3F3A6-A8C0-4943-BFC3-EE75978EB55C}" destId="{FC542BF3-5C1C-42C5-B5E5-6321BB8EB7F9}" srcOrd="0" destOrd="0" presId="urn:microsoft.com/office/officeart/2005/8/layout/cycle2"/>
     <dgm:cxn modelId="{97FDE106-5571-4FC5-85CF-1BD6D4110310}" type="presParOf" srcId="{0CF3F3A6-A8C0-4943-BFC3-EE75978EB55C}" destId="{FA7B59B5-FC02-4344-AC79-BB949A239074}" srcOrd="1" destOrd="0" presId="urn:microsoft.com/office/officeart/2005/8/layout/cycle2"/>
     <dgm:cxn modelId="{13650439-FD84-4329-AA0B-863212BEB5D1}" type="presParOf" srcId="{FA7B59B5-FC02-4344-AC79-BB949A239074}" destId="{A70BC138-62CC-44F9-9D81-A0D94D618821}" srcOrd="0" destOrd="0" presId="urn:microsoft.com/office/officeart/2005/8/layout/cycle2"/>
@@ -1389,7 +1277,7 @@
         </a:bodyPr>
         <a:lstStyle/>
         <a:p>
-          <a:pPr lvl="0" algn="ctr" defTabSz="488950">
+          <a:pPr marL="0" lvl="0" indent="0" algn="ctr" defTabSz="488950">
             <a:lnSpc>
               <a:spcPct val="90000"/>
             </a:lnSpc>
@@ -1399,6 +1287,7 @@
             <a:spcAft>
               <a:spcPct val="35000"/>
             </a:spcAft>
+            <a:buNone/>
           </a:pPr>
           <a:r>
             <a:rPr lang="en-US" sz="1100" kern="1200" dirty="0"/>
@@ -1461,7 +1350,7 @@
         </a:bodyPr>
         <a:lstStyle/>
         <a:p>
-          <a:pPr lvl="0" algn="ctr" defTabSz="400050">
+          <a:pPr marL="0" lvl="0" indent="0" algn="ctr" defTabSz="400050">
             <a:lnSpc>
               <a:spcPct val="90000"/>
             </a:lnSpc>
@@ -1471,6 +1360,7 @@
             <a:spcAft>
               <a:spcPct val="35000"/>
             </a:spcAft>
+            <a:buNone/>
           </a:pPr>
           <a:endParaRPr lang="en-US" sz="900" kern="1200"/>
         </a:p>
@@ -1534,7 +1424,7 @@
         </a:bodyPr>
         <a:lstStyle/>
         <a:p>
-          <a:pPr lvl="0" algn="ctr" defTabSz="488950">
+          <a:pPr marL="0" lvl="0" indent="0" algn="ctr" defTabSz="488950">
             <a:lnSpc>
               <a:spcPct val="90000"/>
             </a:lnSpc>
@@ -1544,6 +1434,7 @@
             <a:spcAft>
               <a:spcPct val="35000"/>
             </a:spcAft>
+            <a:buNone/>
           </a:pPr>
           <a:r>
             <a:rPr lang="en-US" sz="1100" kern="1200" dirty="0"/>
@@ -1606,7 +1497,7 @@
         </a:bodyPr>
         <a:lstStyle/>
         <a:p>
-          <a:pPr lvl="0" algn="ctr" defTabSz="400050">
+          <a:pPr marL="0" lvl="0" indent="0" algn="ctr" defTabSz="400050">
             <a:lnSpc>
               <a:spcPct val="90000"/>
             </a:lnSpc>
@@ -1616,6 +1507,7 @@
             <a:spcAft>
               <a:spcPct val="35000"/>
             </a:spcAft>
+            <a:buNone/>
           </a:pPr>
           <a:endParaRPr lang="en-US" sz="900" kern="1200"/>
         </a:p>
@@ -1679,7 +1571,7 @@
         </a:bodyPr>
         <a:lstStyle/>
         <a:p>
-          <a:pPr lvl="0" algn="ctr" defTabSz="488950">
+          <a:pPr marL="0" lvl="0" indent="0" algn="ctr" defTabSz="488950">
             <a:lnSpc>
               <a:spcPct val="90000"/>
             </a:lnSpc>
@@ -1689,6 +1581,7 @@
             <a:spcAft>
               <a:spcPct val="35000"/>
             </a:spcAft>
+            <a:buNone/>
           </a:pPr>
           <a:r>
             <a:rPr lang="en-US" sz="1100" kern="1200" dirty="0"/>
@@ -1751,7 +1644,7 @@
         </a:bodyPr>
         <a:lstStyle/>
         <a:p>
-          <a:pPr lvl="0" algn="ctr" defTabSz="400050">
+          <a:pPr marL="0" lvl="0" indent="0" algn="ctr" defTabSz="400050">
             <a:lnSpc>
               <a:spcPct val="90000"/>
             </a:lnSpc>
@@ -1761,6 +1654,7 @@
             <a:spcAft>
               <a:spcPct val="35000"/>
             </a:spcAft>
+            <a:buNone/>
           </a:pPr>
           <a:endParaRPr lang="en-US" sz="900" kern="1200"/>
         </a:p>
@@ -1824,7 +1718,7 @@
         </a:bodyPr>
         <a:lstStyle/>
         <a:p>
-          <a:pPr lvl="0" algn="ctr" defTabSz="488950">
+          <a:pPr marL="0" lvl="0" indent="0" algn="ctr" defTabSz="488950">
             <a:lnSpc>
               <a:spcPct val="90000"/>
             </a:lnSpc>
@@ -1834,6 +1728,7 @@
             <a:spcAft>
               <a:spcPct val="35000"/>
             </a:spcAft>
+            <a:buNone/>
           </a:pPr>
           <a:r>
             <a:rPr lang="en-US" sz="1100" kern="1200" dirty="0"/>
@@ -1896,7 +1791,7 @@
         </a:bodyPr>
         <a:lstStyle/>
         <a:p>
-          <a:pPr lvl="0" algn="ctr" defTabSz="400050">
+          <a:pPr marL="0" lvl="0" indent="0" algn="ctr" defTabSz="400050">
             <a:lnSpc>
               <a:spcPct val="90000"/>
             </a:lnSpc>
@@ -1906,6 +1801,7 @@
             <a:spcAft>
               <a:spcPct val="35000"/>
             </a:spcAft>
+            <a:buNone/>
           </a:pPr>
           <a:endParaRPr lang="en-US" sz="900" kern="1200"/>
         </a:p>
@@ -1969,7 +1865,7 @@
         </a:bodyPr>
         <a:lstStyle/>
         <a:p>
-          <a:pPr lvl="0" algn="ctr" defTabSz="488950">
+          <a:pPr marL="0" lvl="0" indent="0" algn="ctr" defTabSz="488950">
             <a:lnSpc>
               <a:spcPct val="90000"/>
             </a:lnSpc>
@@ -1979,6 +1875,7 @@
             <a:spcAft>
               <a:spcPct val="35000"/>
             </a:spcAft>
+            <a:buNone/>
           </a:pPr>
           <a:r>
             <a:rPr lang="en-US" sz="1100" kern="1200" dirty="0"/>
@@ -2041,7 +1938,7 @@
         </a:bodyPr>
         <a:lstStyle/>
         <a:p>
-          <a:pPr lvl="0" algn="ctr" defTabSz="400050">
+          <a:pPr marL="0" lvl="0" indent="0" algn="ctr" defTabSz="400050">
             <a:lnSpc>
               <a:spcPct val="90000"/>
             </a:lnSpc>
@@ -2051,6 +1948,7 @@
             <a:spcAft>
               <a:spcPct val="35000"/>
             </a:spcAft>
+            <a:buNone/>
           </a:pPr>
           <a:endParaRPr lang="en-US" sz="900" kern="1200"/>
         </a:p>
@@ -3391,7 +3289,7 @@
           <a:p>
             <a:fld id="{E24AA05B-9E20-4E9A-9BAD-CB7BC27F0CA9}" type="datetimeFigureOut">
               <a:rPr lang="en-GB" smtClean="0"/>
-              <a:t>15/09/2017</a:t>
+              <a:t>16/09/2017</a:t>
             </a:fld>
             <a:endParaRPr lang="en-GB"/>
           </a:p>
@@ -3867,11 +3765,7 @@
             </a:pPr>
             <a:r>
               <a:rPr lang="en-GB" dirty="0"/>
-              <a:t>Eternal business complaint: IT is </a:t>
-            </a:r>
-            <a:r>
-              <a:rPr lang="en-GB" dirty="0" smtClean="0"/>
-              <a:t>slow</a:t>
+              <a:t>Eternal business complaint: IT is slow</a:t>
             </a:r>
           </a:p>
           <a:p>
@@ -3893,19 +3787,19 @@
               <a:defRPr/>
             </a:pPr>
             <a:r>
-              <a:rPr lang="en-GB" dirty="0" smtClean="0"/>
+              <a:rPr lang="en-GB" dirty="0"/>
               <a:t>Customers</a:t>
             </a:r>
             <a:r>
-              <a:rPr lang="en-GB" baseline="0" dirty="0" smtClean="0"/>
+              <a:rPr lang="en-GB" baseline="0" dirty="0"/>
               <a:t> not necessarily end-users: example of our client -&gt; </a:t>
             </a:r>
             <a:r>
-              <a:rPr lang="en-GB" baseline="0" dirty="0" err="1" smtClean="0"/>
+              <a:rPr lang="en-GB" baseline="0" dirty="0" err="1"/>
               <a:t>MyAccount</a:t>
             </a:r>
             <a:r>
-              <a:rPr lang="en-GB" baseline="0" dirty="0" smtClean="0"/>
+              <a:rPr lang="en-GB" baseline="0" dirty="0"/>
               <a:t> team</a:t>
             </a:r>
             <a:endParaRPr lang="en-GB" dirty="0"/>
@@ -3973,23 +3867,7 @@
             </a:pPr>
             <a:r>
               <a:rPr lang="en-GB" dirty="0"/>
-              <a:t>Work out what the smallest possible amount of work you can do </a:t>
-            </a:r>
-            <a:r>
-              <a:rPr lang="en-GB" dirty="0" smtClean="0"/>
-              <a:t>to test </a:t>
-            </a:r>
-            <a:r>
-              <a:rPr lang="en-GB" dirty="0"/>
-              <a:t>your </a:t>
-            </a:r>
-            <a:r>
-              <a:rPr lang="en-GB" dirty="0" smtClean="0"/>
-              <a:t>idea, </a:t>
-            </a:r>
-            <a:r>
-              <a:rPr lang="en-GB" dirty="0"/>
-              <a:t>prove your point, get feedback, and... repeat</a:t>
+              <a:t>Work out what the smallest possible amount of work you can do to test your idea, prove your point, get feedback, and... repeat</a:t>
             </a:r>
           </a:p>
           <a:p>
@@ -4156,6 +4034,12 @@
             </a:pPr>
             <a:endParaRPr lang="en-GB" b="1" dirty="0"/>
           </a:p>
+          <a:p>
+            <a:pPr marL="0" indent="0">
+              <a:buNone/>
+            </a:pPr>
+            <a:endParaRPr lang="en-GB" b="1" dirty="0"/>
+          </a:p>
         </p:txBody>
       </p:sp>
       <p:sp>
@@ -4238,6 +4122,66 @@
           <a:bodyPr/>
           <a:lstStyle/>
           <a:p>
+            <a:r>
+              <a:rPr lang="en-GB" sz="1200" b="1" i="0" kern="1200" dirty="0">
+                <a:solidFill>
+                  <a:schemeClr val="tx1"/>
+                </a:solidFill>
+                <a:effectLst/>
+                <a:latin typeface="+mn-lt"/>
+                <a:ea typeface="+mn-ea"/>
+                <a:cs typeface="+mn-cs"/>
+              </a:rPr>
+              <a:t>Continuous Delivery</a:t>
+            </a:r>
+            <a:r>
+              <a:rPr lang="en-GB" sz="1200" b="0" i="0" kern="1200" dirty="0">
+                <a:solidFill>
+                  <a:schemeClr val="tx1"/>
+                </a:solidFill>
+                <a:effectLst/>
+                <a:latin typeface="+mn-lt"/>
+                <a:ea typeface="+mn-ea"/>
+                <a:cs typeface="+mn-cs"/>
+              </a:rPr>
+              <a:t> takes </a:t>
+            </a:r>
+            <a:r>
+              <a:rPr lang="en-GB" sz="1200" b="1" i="0" kern="1200" dirty="0">
+                <a:solidFill>
+                  <a:schemeClr val="tx1"/>
+                </a:solidFill>
+                <a:effectLst/>
+                <a:latin typeface="+mn-lt"/>
+                <a:ea typeface="+mn-ea"/>
+                <a:cs typeface="+mn-cs"/>
+              </a:rPr>
+              <a:t>Agile</a:t>
+            </a:r>
+            <a:r>
+              <a:rPr lang="en-GB" sz="1200" b="0" i="0" kern="1200" dirty="0">
+                <a:solidFill>
+                  <a:schemeClr val="tx1"/>
+                </a:solidFill>
+                <a:effectLst/>
+                <a:latin typeface="+mn-lt"/>
+                <a:ea typeface="+mn-ea"/>
+                <a:cs typeface="+mn-cs"/>
+              </a:rPr>
+              <a:t> to its logical conclusion, creating software that is always </a:t>
+            </a:r>
+            <a:r>
+              <a:rPr lang="en-GB" sz="1200" b="1" i="0" kern="1200" dirty="0">
+                <a:solidFill>
+                  <a:schemeClr val="tx1"/>
+                </a:solidFill>
+                <a:effectLst/>
+                <a:latin typeface="+mn-lt"/>
+                <a:ea typeface="+mn-ea"/>
+                <a:cs typeface="+mn-cs"/>
+              </a:rPr>
+              <a:t>ready to release</a:t>
+            </a:r>
             <a:endParaRPr lang="en-GB" dirty="0"/>
           </a:p>
         </p:txBody>
@@ -4322,6 +4266,154 @@
           <a:bodyPr/>
           <a:lstStyle/>
           <a:p>
+            <a:r>
+              <a:rPr lang="en-GB" sz="1200" b="1" i="0" kern="1200" dirty="0">
+                <a:solidFill>
+                  <a:schemeClr val="tx1"/>
+                </a:solidFill>
+                <a:effectLst/>
+                <a:latin typeface="+mn-lt"/>
+                <a:ea typeface="+mn-ea"/>
+                <a:cs typeface="+mn-cs"/>
+              </a:rPr>
+              <a:t>Continuous Integration</a:t>
+            </a:r>
+            <a:r>
+              <a:rPr lang="en-GB" sz="1200" b="0" i="0" kern="1200" dirty="0">
+                <a:solidFill>
+                  <a:schemeClr val="tx1"/>
+                </a:solidFill>
+                <a:effectLst/>
+                <a:latin typeface="+mn-lt"/>
+                <a:ea typeface="+mn-ea"/>
+                <a:cs typeface="+mn-cs"/>
+              </a:rPr>
+              <a:t> (CI) is a development practice that requires developers to </a:t>
+            </a:r>
+            <a:r>
+              <a:rPr lang="en-GB" sz="1200" b="1" i="0" kern="1200" dirty="0">
+                <a:solidFill>
+                  <a:schemeClr val="tx1"/>
+                </a:solidFill>
+                <a:effectLst/>
+                <a:latin typeface="+mn-lt"/>
+                <a:ea typeface="+mn-ea"/>
+                <a:cs typeface="+mn-cs"/>
+              </a:rPr>
+              <a:t>integrate</a:t>
+            </a:r>
+            <a:r>
+              <a:rPr lang="en-GB" sz="1200" b="0" i="0" kern="1200" dirty="0">
+                <a:solidFill>
+                  <a:schemeClr val="tx1"/>
+                </a:solidFill>
+                <a:effectLst/>
+                <a:latin typeface="+mn-lt"/>
+                <a:ea typeface="+mn-ea"/>
+                <a:cs typeface="+mn-cs"/>
+              </a:rPr>
+              <a:t> code into a shared repository </a:t>
+            </a:r>
+          </a:p>
+          <a:p>
+            <a:r>
+              <a:rPr lang="en-GB" sz="1200" b="0" i="0" kern="1200" dirty="0">
+                <a:solidFill>
+                  <a:schemeClr val="tx1"/>
+                </a:solidFill>
+                <a:effectLst/>
+                <a:latin typeface="+mn-lt"/>
+                <a:ea typeface="+mn-ea"/>
+                <a:cs typeface="+mn-cs"/>
+              </a:rPr>
+              <a:t>several times a day. </a:t>
+            </a:r>
+          </a:p>
+          <a:p>
+            <a:r>
+              <a:rPr lang="en-GB" sz="1200" b="0" i="0" kern="1200" dirty="0">
+                <a:solidFill>
+                  <a:schemeClr val="tx1"/>
+                </a:solidFill>
+                <a:effectLst/>
+                <a:latin typeface="+mn-lt"/>
+                <a:ea typeface="+mn-ea"/>
+                <a:cs typeface="+mn-cs"/>
+              </a:rPr>
+              <a:t>Each check-in or commit is then </a:t>
+            </a:r>
+            <a:r>
+              <a:rPr lang="en-GB" sz="1200" b="1" i="0" kern="1200" dirty="0">
+                <a:solidFill>
+                  <a:schemeClr val="tx1"/>
+                </a:solidFill>
+                <a:effectLst/>
+                <a:latin typeface="+mn-lt"/>
+                <a:ea typeface="+mn-ea"/>
+                <a:cs typeface="+mn-cs"/>
+              </a:rPr>
+              <a:t>verified</a:t>
+            </a:r>
+            <a:r>
+              <a:rPr lang="en-GB" sz="1200" b="0" i="0" kern="1200" dirty="0">
+                <a:solidFill>
+                  <a:schemeClr val="tx1"/>
+                </a:solidFill>
+                <a:effectLst/>
+                <a:latin typeface="+mn-lt"/>
+                <a:ea typeface="+mn-ea"/>
+                <a:cs typeface="+mn-cs"/>
+              </a:rPr>
+              <a:t> by an automated process, called “</a:t>
+            </a:r>
+            <a:r>
+              <a:rPr lang="en-GB" sz="1200" b="1" i="0" kern="1200" dirty="0">
+                <a:solidFill>
+                  <a:schemeClr val="tx1"/>
+                </a:solidFill>
+                <a:effectLst/>
+                <a:latin typeface="+mn-lt"/>
+                <a:ea typeface="+mn-ea"/>
+                <a:cs typeface="+mn-cs"/>
+              </a:rPr>
+              <a:t>build”</a:t>
+            </a:r>
+            <a:r>
+              <a:rPr lang="en-GB" sz="1200" b="0" i="0" kern="1200" dirty="0">
+                <a:solidFill>
+                  <a:schemeClr val="tx1"/>
+                </a:solidFill>
+                <a:effectLst/>
+                <a:latin typeface="+mn-lt"/>
+                <a:ea typeface="+mn-ea"/>
+                <a:cs typeface="+mn-cs"/>
+              </a:rPr>
+              <a:t>, that confirms whether the commit is </a:t>
+            </a:r>
+            <a:r>
+              <a:rPr lang="en-GB" sz="1200" b="1" i="0" kern="1200" dirty="0">
+                <a:solidFill>
+                  <a:schemeClr val="tx1"/>
+                </a:solidFill>
+                <a:effectLst/>
+                <a:latin typeface="+mn-lt"/>
+                <a:ea typeface="+mn-ea"/>
+                <a:cs typeface="+mn-cs"/>
+              </a:rPr>
+              <a:t>OK or not</a:t>
+            </a:r>
+            <a:r>
+              <a:rPr lang="en-GB" sz="1200" b="0" i="0" kern="1200" dirty="0">
+                <a:solidFill>
+                  <a:schemeClr val="tx1"/>
+                </a:solidFill>
+                <a:effectLst/>
+                <a:latin typeface="+mn-lt"/>
+                <a:ea typeface="+mn-ea"/>
+                <a:cs typeface="+mn-cs"/>
+              </a:rPr>
+              <a:t>, allowing teams to detect problems early and react to them</a:t>
+            </a:r>
             <a:endParaRPr lang="en-GB" dirty="0"/>
           </a:p>
         </p:txBody>
@@ -4899,11 +4991,11 @@
           <a:lstStyle/>
           <a:p>
             <a:r>
-              <a:rPr lang="en-GB" dirty="0" smtClean="0"/>
+              <a:rPr lang="en-GB" dirty="0"/>
               <a:t>Traditional</a:t>
             </a:r>
             <a:r>
-              <a:rPr lang="en-GB" baseline="0" dirty="0" smtClean="0"/>
+              <a:rPr lang="en-GB" baseline="0" dirty="0"/>
               <a:t> lifecycle of a feature/product</a:t>
             </a:r>
             <a:endParaRPr lang="en-GB" dirty="0"/>
@@ -5004,11 +5096,7 @@
             </a:r>
             <a:r>
               <a:rPr lang="en-GB" dirty="0"/>
-              <a:t>iterate, yes… to some </a:t>
-            </a:r>
-            <a:r>
-              <a:rPr lang="en-GB" dirty="0" smtClean="0"/>
-              <a:t>extent</a:t>
+              <a:t>iterate, yes… to some extent</a:t>
             </a:r>
           </a:p>
         </p:txBody>
@@ -5098,15 +5186,15 @@
               <a:t>But problems usually arise </a:t>
             </a:r>
             <a:r>
-              <a:rPr lang="en-GB" b="1" dirty="0" smtClean="0"/>
+              <a:rPr lang="en-GB" b="1" dirty="0"/>
               <a:t>here. </a:t>
             </a:r>
             <a:r>
-              <a:rPr lang="en-GB" b="0" dirty="0" smtClean="0"/>
+              <a:rPr lang="en-GB" b="0" dirty="0"/>
               <a:t>Operations</a:t>
             </a:r>
             <a:r>
-              <a:rPr lang="en-GB" b="0" baseline="0" dirty="0" smtClean="0"/>
+              <a:rPr lang="en-GB" b="0" baseline="0" dirty="0"/>
               <a:t> hasn’t developed the code, they struggle to support it</a:t>
             </a:r>
             <a:endParaRPr lang="en-GB" b="1" dirty="0"/>
@@ -5126,27 +5214,19 @@
           </a:p>
           <a:p>
             <a:r>
-              <a:rPr lang="en-GB" b="0" dirty="0" smtClean="0"/>
-              <a:t>It’s </a:t>
-            </a:r>
-            <a:r>
               <a:rPr lang="en-GB" b="0" dirty="0"/>
-              <a:t>accessible to nobody, and we don’t know if it actually works where we want it to work: </a:t>
-            </a:r>
-            <a:r>
-              <a:rPr lang="en-GB" b="0" dirty="0" smtClean="0"/>
-              <a:t>th</a:t>
-            </a:r>
-            <a:r>
-              <a:rPr lang="en-GB" b="0" baseline="0" dirty="0" smtClean="0"/>
+              <a:t>It’s accessible to nobody, and we don’t know if it actually works where we want it to work: th</a:t>
+            </a:r>
+            <a:r>
+              <a:rPr lang="en-GB" b="0" baseline="0" dirty="0"/>
               <a:t>e </a:t>
             </a:r>
             <a:r>
-              <a:rPr lang="en-GB" b="1" dirty="0" smtClean="0"/>
+              <a:rPr lang="en-GB" b="1" dirty="0"/>
               <a:t>Production </a:t>
             </a:r>
             <a:r>
-              <a:rPr lang="en-GB" b="0" dirty="0" smtClean="0"/>
+              <a:rPr lang="en-GB" b="0" dirty="0"/>
               <a:t>environment</a:t>
             </a:r>
             <a:endParaRPr lang="en-GB" b="1" dirty="0"/>
@@ -5664,7 +5744,7 @@
           <a:p>
             <a:fld id="{69D89977-0975-47F9-BD5E-FA2A8586144A}" type="datetimeFigureOut">
               <a:rPr lang="en-GB" smtClean="0"/>
-              <a:t>15/09/2017</a:t>
+              <a:t>16/09/2017</a:t>
             </a:fld>
             <a:endParaRPr lang="en-GB"/>
           </a:p>
@@ -5834,7 +5914,7 @@
           <a:p>
             <a:fld id="{69D89977-0975-47F9-BD5E-FA2A8586144A}" type="datetimeFigureOut">
               <a:rPr lang="en-GB" smtClean="0"/>
-              <a:t>15/09/2017</a:t>
+              <a:t>16/09/2017</a:t>
             </a:fld>
             <a:endParaRPr lang="en-GB"/>
           </a:p>
@@ -6014,7 +6094,7 @@
           <a:p>
             <a:fld id="{69D89977-0975-47F9-BD5E-FA2A8586144A}" type="datetimeFigureOut">
               <a:rPr lang="en-GB" smtClean="0"/>
-              <a:t>15/09/2017</a:t>
+              <a:t>16/09/2017</a:t>
             </a:fld>
             <a:endParaRPr lang="en-GB"/>
           </a:p>
@@ -6184,7 +6264,7 @@
           <a:p>
             <a:fld id="{69D89977-0975-47F9-BD5E-FA2A8586144A}" type="datetimeFigureOut">
               <a:rPr lang="en-GB" smtClean="0"/>
-              <a:t>15/09/2017</a:t>
+              <a:t>16/09/2017</a:t>
             </a:fld>
             <a:endParaRPr lang="en-GB"/>
           </a:p>
@@ -6442,7 +6522,7 @@
           <a:p>
             <a:fld id="{69D89977-0975-47F9-BD5E-FA2A8586144A}" type="datetimeFigureOut">
               <a:rPr lang="en-GB" smtClean="0"/>
-              <a:t>15/09/2017</a:t>
+              <a:t>16/09/2017</a:t>
             </a:fld>
             <a:endParaRPr lang="en-GB"/>
           </a:p>
@@ -6730,7 +6810,7 @@
           <a:p>
             <a:fld id="{69D89977-0975-47F9-BD5E-FA2A8586144A}" type="datetimeFigureOut">
               <a:rPr lang="en-GB" smtClean="0"/>
-              <a:t>15/09/2017</a:t>
+              <a:t>16/09/2017</a:t>
             </a:fld>
             <a:endParaRPr lang="en-GB"/>
           </a:p>
@@ -7172,7 +7252,7 @@
           <a:p>
             <a:fld id="{69D89977-0975-47F9-BD5E-FA2A8586144A}" type="datetimeFigureOut">
               <a:rPr lang="en-GB" smtClean="0"/>
-              <a:t>15/09/2017</a:t>
+              <a:t>16/09/2017</a:t>
             </a:fld>
             <a:endParaRPr lang="en-GB"/>
           </a:p>
@@ -7290,7 +7370,7 @@
           <a:p>
             <a:fld id="{69D89977-0975-47F9-BD5E-FA2A8586144A}" type="datetimeFigureOut">
               <a:rPr lang="en-GB" smtClean="0"/>
-              <a:t>15/09/2017</a:t>
+              <a:t>16/09/2017</a:t>
             </a:fld>
             <a:endParaRPr lang="en-GB"/>
           </a:p>
@@ -7385,7 +7465,7 @@
           <a:p>
             <a:fld id="{69D89977-0975-47F9-BD5E-FA2A8586144A}" type="datetimeFigureOut">
               <a:rPr lang="en-GB" smtClean="0"/>
-              <a:t>15/09/2017</a:t>
+              <a:t>16/09/2017</a:t>
             </a:fld>
             <a:endParaRPr lang="en-GB"/>
           </a:p>
@@ -7673,7 +7753,7 @@
           <a:p>
             <a:fld id="{69D89977-0975-47F9-BD5E-FA2A8586144A}" type="datetimeFigureOut">
               <a:rPr lang="en-GB" smtClean="0"/>
-              <a:t>15/09/2017</a:t>
+              <a:t>16/09/2017</a:t>
             </a:fld>
             <a:endParaRPr lang="en-GB"/>
           </a:p>
@@ -7946,7 +8026,7 @@
           <a:p>
             <a:fld id="{69D89977-0975-47F9-BD5E-FA2A8586144A}" type="datetimeFigureOut">
               <a:rPr lang="en-GB" smtClean="0"/>
-              <a:t>15/09/2017</a:t>
+              <a:t>16/09/2017</a:t>
             </a:fld>
             <a:endParaRPr lang="en-GB"/>
           </a:p>
@@ -8243,7 +8323,7 @@
           <a:p>
             <a:fld id="{69D89977-0975-47F9-BD5E-FA2A8586144A}" type="datetimeFigureOut">
               <a:rPr lang="en-GB" smtClean="0"/>
-              <a:t>15/09/2017</a:t>
+              <a:t>16/09/2017</a:t>
             </a:fld>
             <a:endParaRPr lang="en-GB"/>
           </a:p>
@@ -8791,13 +8871,6 @@
   <p:clrMapOvr>
     <a:masterClrMapping/>
   </p:clrMapOvr>
-  <p:timing>
-    <p:tnLst>
-      <p:par>
-        <p:cTn id="1" dur="indefinite" restart="never" nodeType="tmRoot"/>
-      </p:par>
-    </p:tnLst>
-  </p:timing>
 </p:sld>
 </file>
 
@@ -9668,13 +9741,6 @@
   <p:clrMapOvr>
     <a:masterClrMapping/>
   </p:clrMapOvr>
-  <p:timing>
-    <p:tnLst>
-      <p:par>
-        <p:cTn id="1" dur="indefinite" restart="never" nodeType="tmRoot"/>
-      </p:par>
-    </p:tnLst>
-  </p:timing>
 </p:sld>
 </file>
 
@@ -9990,13 +10056,8 @@
             </a:r>
             <a:r>
               <a:rPr lang="en-US" i="1" dirty="0"/>
-              <a:t> over following a </a:t>
-            </a:r>
-            <a:r>
-              <a:rPr lang="en-US" i="1" dirty="0" smtClean="0"/>
-              <a:t>plan</a:t>
-            </a:r>
-            <a:endParaRPr lang="en-US" i="1" dirty="0"/>
+              <a:t> over following a plan</a:t>
+            </a:r>
           </a:p>
         </p:txBody>
       </p:sp>
@@ -10010,13 +10071,6 @@
   <p:clrMapOvr>
     <a:masterClrMapping/>
   </p:clrMapOvr>
-  <p:timing>
-    <p:tnLst>
-      <p:par>
-        <p:cTn id="1" dur="indefinite" restart="never" nodeType="tmRoot"/>
-      </p:par>
-    </p:tnLst>
-  </p:timing>
 </p:sld>
 </file>
 
@@ -10179,15 +10233,7 @@
           <a:p>
             <a:r>
               <a:rPr lang="en-GB" dirty="0"/>
-              <a:t>Work out what the smallest possible amount of work you can </a:t>
-            </a:r>
-            <a:r>
-              <a:rPr lang="en-GB" dirty="0" smtClean="0"/>
-              <a:t>do to </a:t>
-            </a:r>
-            <a:r>
-              <a:rPr lang="en-GB" dirty="0"/>
-              <a:t>test your idea, get feedback, and... repeat</a:t>
+              <a:t>Work out what the smallest possible amount of work you can do to test your idea, get feedback, and... repeat</a:t>
             </a:r>
           </a:p>
         </p:txBody>
@@ -10202,13 +10248,6 @@
   <p:clrMapOvr>
     <a:masterClrMapping/>
   </p:clrMapOvr>
-  <p:timing>
-    <p:tnLst>
-      <p:par>
-        <p:cTn id="1" dur="indefinite" restart="never" nodeType="tmRoot"/>
-      </p:par>
-    </p:tnLst>
-  </p:timing>
 </p:sld>
 </file>
 
@@ -10494,13 +10533,6 @@
   <p:clrMapOvr>
     <a:masterClrMapping/>
   </p:clrMapOvr>
-  <p:timing>
-    <p:tnLst>
-      <p:par>
-        <p:cTn id="1" dur="indefinite" restart="never" nodeType="tmRoot"/>
-      </p:par>
-    </p:tnLst>
-  </p:timing>
 </p:sld>
 </file>
 
@@ -10563,13 +10595,6 @@
   <p:clrMapOvr>
     <a:masterClrMapping/>
   </p:clrMapOvr>
-  <p:timing>
-    <p:tnLst>
-      <p:par>
-        <p:cTn id="1" dur="indefinite" restart="never" nodeType="tmRoot"/>
-      </p:par>
-    </p:tnLst>
-  </p:timing>
 </p:sld>
 </file>
 
@@ -10643,7 +10668,7 @@
               <a:buNone/>
             </a:pPr>
             <a:r>
-              <a:rPr lang="en-GB" dirty="0"/>
+              <a:rPr lang="en-GB" i="1" dirty="0"/>
               <a:t>We want…</a:t>
             </a:r>
           </a:p>
@@ -10688,8 +10713,20 @@
               <a:buNone/>
             </a:pPr>
             <a:r>
-              <a:rPr lang="en-GB" dirty="0"/>
-              <a:t>Deploy N times</a:t>
+              <a:rPr lang="en-GB" b="1" dirty="0">
+                <a:solidFill>
+                  <a:schemeClr val="accent1"/>
+                </a:solidFill>
+              </a:rPr>
+              <a:t>Deploy</a:t>
+            </a:r>
+            <a:r>
+              <a:rPr lang="en-GB" dirty="0">
+                <a:solidFill>
+                  <a:schemeClr val="accent1"/>
+                </a:solidFill>
+              </a:rPr>
+              <a:t> N times</a:t>
             </a:r>
           </a:p>
           <a:p>
@@ -10697,8 +10734,20 @@
               <a:buNone/>
             </a:pPr>
             <a:r>
-              <a:rPr lang="en-GB" dirty="0"/>
-              <a:t>Release by “enabling a flag”</a:t>
+              <a:rPr lang="en-GB" b="1" dirty="0">
+                <a:solidFill>
+                  <a:schemeClr val="accent1"/>
+                </a:solidFill>
+              </a:rPr>
+              <a:t>Release</a:t>
+            </a:r>
+            <a:r>
+              <a:rPr lang="en-GB" dirty="0">
+                <a:solidFill>
+                  <a:schemeClr val="accent1"/>
+                </a:solidFill>
+              </a:rPr>
+              <a:t> by simply “enabling a flag”</a:t>
             </a:r>
           </a:p>
           <a:p>
@@ -10719,13 +10768,6 @@
   <p:clrMapOvr>
     <a:masterClrMapping/>
   </p:clrMapOvr>
-  <p:timing>
-    <p:tnLst>
-      <p:par>
-        <p:cTn id="1" dur="indefinite" restart="never" nodeType="tmRoot"/>
-      </p:par>
-    </p:tnLst>
-  </p:timing>
 </p:sld>
 </file>
 
@@ -10762,7 +10804,12 @@
             <p:ph type="title"/>
           </p:nvPr>
         </p:nvSpPr>
-        <p:spPr/>
+        <p:spPr>
+          <a:xfrm>
+            <a:off x="252919" y="1123837"/>
+            <a:ext cx="2947482" cy="4601183"/>
+          </a:xfrm>
+        </p:spPr>
         <p:txBody>
           <a:bodyPr/>
           <a:lstStyle/>
@@ -10771,64 +10818,62 @@
               <a:rPr lang="en-GB" dirty="0"/>
               <a:t>Practices	</a:t>
             </a:r>
-          </a:p>
-        </p:txBody>
-      </p:sp>
-      <p:sp>
-        <p:nvSpPr>
-          <p:cNvPr id="3" name="Content Placeholder 2">
+            <a:br>
+              <a:rPr lang="en-GB" dirty="0"/>
+            </a:br>
+            <a:r>
+              <a:rPr lang="en-GB" sz="2000" dirty="0"/>
+              <a:t>Continuous Integration</a:t>
+            </a:r>
+            <a:endParaRPr lang="en-GB" dirty="0"/>
+          </a:p>
+        </p:txBody>
+      </p:sp>
+      <p:pic>
+        <p:nvPicPr>
+          <p:cNvPr id="16" name="Picture 2" descr="https://devopscube.com/wp-content/uploads/2016/10/continuous-integration-in-devops.jpg">
             <a:extLst>
               <a:ext uri="{FF2B5EF4-FFF2-40B4-BE49-F238E27FC236}">
-                <a16:creationId xmlns:a16="http://schemas.microsoft.com/office/drawing/2014/main" id="{5D144876-B2BC-41EA-A7F9-FD3346DAB54E}"/>
+                <a16:creationId xmlns:a16="http://schemas.microsoft.com/office/drawing/2014/main" id="{826A376A-ABC3-4A04-800F-0C222CE5B97E}"/>
               </a:ext>
             </a:extLst>
           </p:cNvPr>
-          <p:cNvSpPr>
-            <a:spLocks noGrp="1"/>
-          </p:cNvSpPr>
-          <p:nvPr>
-            <p:ph idx="1"/>
-          </p:nvPr>
-        </p:nvSpPr>
-        <p:spPr/>
-        <p:txBody>
-          <a:bodyPr/>
-          <a:lstStyle/>
-          <a:p>
-            <a:pPr marL="0" indent="0">
-              <a:buNone/>
-            </a:pPr>
-            <a:r>
-              <a:rPr lang="en-GB" dirty="0"/>
-              <a:t>Continuous integration</a:t>
-            </a:r>
-          </a:p>
-          <a:p>
-            <a:pPr marL="0" indent="0">
-              <a:buNone/>
-            </a:pPr>
-            <a:r>
-              <a:rPr lang="en-GB" dirty="0"/>
-              <a:t>Automation</a:t>
-            </a:r>
-          </a:p>
-          <a:p>
-            <a:pPr marL="0" indent="0">
-              <a:buNone/>
-            </a:pPr>
-            <a:r>
-              <a:rPr lang="en-GB" dirty="0"/>
-              <a:t>Deployment pipeline</a:t>
-            </a:r>
-          </a:p>
-          <a:p>
-            <a:pPr marL="0" indent="0">
-              <a:buNone/>
-            </a:pPr>
-            <a:endParaRPr lang="en-GB" dirty="0"/>
-          </a:p>
-        </p:txBody>
-      </p:sp>
+          <p:cNvPicPr>
+            <a:picLocks noChangeAspect="1" noChangeArrowheads="1"/>
+          </p:cNvPicPr>
+          <p:nvPr/>
+        </p:nvPicPr>
+        <p:blipFill rotWithShape="1">
+          <a:blip r:embed="rId3">
+            <a:extLst>
+              <a:ext uri="{28A0092B-C50C-407E-A947-70E740481C1C}">
+                <a14:useLocalDpi xmlns:a14="http://schemas.microsoft.com/office/drawing/2010/main" val="0"/>
+              </a:ext>
+            </a:extLst>
+          </a:blip>
+          <a:srcRect l="3079" t="5847" r="2892" b="7281"/>
+          <a:stretch/>
+        </p:blipFill>
+        <p:spPr bwMode="auto">
+          <a:xfrm>
+            <a:off x="3645725" y="951139"/>
+            <a:ext cx="7980218" cy="4773881"/>
+          </a:xfrm>
+          <a:prstGeom prst="rect">
+            <a:avLst/>
+          </a:prstGeom>
+          <a:noFill/>
+          <a:extLst>
+            <a:ext uri="{909E8E84-426E-40DD-AFC4-6F175D3DCCD1}">
+              <a14:hiddenFill xmlns:a14="http://schemas.microsoft.com/office/drawing/2010/main">
+                <a:solidFill>
+                  <a:srgbClr val="FFFFFF"/>
+                </a:solidFill>
+              </a14:hiddenFill>
+            </a:ext>
+          </a:extLst>
+        </p:spPr>
+      </p:pic>
     </p:spTree>
     <p:extLst>
       <p:ext uri="{BB962C8B-B14F-4D97-AF65-F5344CB8AC3E}">
@@ -10839,13 +10884,6 @@
   <p:clrMapOvr>
     <a:masterClrMapping/>
   </p:clrMapOvr>
-  <p:timing>
-    <p:tnLst>
-      <p:par>
-        <p:cTn id="1" dur="indefinite" restart="never" nodeType="tmRoot"/>
-      </p:par>
-    </p:tnLst>
-  </p:timing>
 </p:sld>
 </file>
 
@@ -10866,9 +10904,9 @@
           <a:chExt cx="0" cy="0"/>
         </a:xfrm>
       </p:grpSpPr>
-      <p:sp>
-        <p:nvSpPr>
-          <p:cNvPr id="9" name="Rectangle 8"/>
+      <p:sp useBgFill="1">
+        <p:nvSpPr>
+          <p:cNvPr id="17" name="Rectangle 9"/>
           <p:cNvSpPr>
             <a:spLocks noGrp="1" noRot="1" noChangeAspect="1" noMove="1" noResize="1" noEditPoints="1" noAdjustHandles="1" noChangeArrowheads="1" noChangeShapeType="1" noTextEdit="1"/>
           </p:cNvSpPr>
@@ -10880,7 +10918,7 @@
             </p:extLst>
           </p:nvPr>
         </p:nvSpPr>
-        <p:spPr bwMode="white">
+        <p:spPr>
           <a:xfrm>
             <a:off x="0" y="0"/>
             <a:ext cx="12192000" cy="6858000"/>
@@ -10888,37 +10926,331 @@
           <a:prstGeom prst="rect">
             <a:avLst/>
           </a:prstGeom>
+          <a:ln>
+            <a:noFill/>
+          </a:ln>
+        </p:spPr>
+        <p:style>
+          <a:lnRef idx="2">
+            <a:schemeClr val="accent1">
+              <a:shade val="50000"/>
+            </a:schemeClr>
+          </a:lnRef>
+          <a:fillRef idx="1">
+            <a:schemeClr val="accent1"/>
+          </a:fillRef>
+          <a:effectRef idx="0">
+            <a:schemeClr val="accent1"/>
+          </a:effectRef>
+          <a:fontRef idx="minor">
+            <a:schemeClr val="lt1"/>
+          </a:fontRef>
+        </p:style>
+        <p:txBody>
+          <a:bodyPr rtlCol="0" anchor="ctr"/>
+          <a:lstStyle/>
+          <a:p>
+            <a:pPr algn="ctr"/>
+            <a:endParaRPr lang="en-US" dirty="0"/>
+          </a:p>
+        </p:txBody>
+      </p:sp>
+      <p:cxnSp>
+        <p:nvCxnSpPr>
+          <p:cNvPr id="18" name="Straight Connector 11">
+            <a:extLst/>
+          </p:cNvPr>
+          <p:cNvCxnSpPr>
+            <a:cxnSpLocks noGrp="1" noRot="1" noChangeAspect="1" noMove="1" noResize="1" noEditPoints="1" noAdjustHandles="1" noChangeArrowheads="1" noChangeShapeType="1"/>
+          </p:cNvCxnSpPr>
+          <p:nvPr>
+            <p:extLst>
+              <p:ext uri="{386F3935-93C4-4BCD-93E2-E3B085C9AB24}">
+                <p16:designElem xmlns:p16="http://schemas.microsoft.com/office/powerpoint/2015/main" val="1"/>
+              </p:ext>
+            </p:extLst>
+          </p:nvPr>
+        </p:nvCxnSpPr>
+        <p:spPr>
+          <a:xfrm>
+            <a:off x="7534656" y="2085681"/>
+            <a:ext cx="0" cy="2686639"/>
+          </a:xfrm>
+          <a:prstGeom prst="line">
+            <a:avLst/>
+          </a:prstGeom>
+          <a:ln w="12700">
+            <a:solidFill>
+              <a:schemeClr val="tx1">
+                <a:lumMod val="50000"/>
+                <a:lumOff val="50000"/>
+              </a:schemeClr>
+            </a:solidFill>
+          </a:ln>
+        </p:spPr>
+        <p:style>
+          <a:lnRef idx="1">
+            <a:schemeClr val="accent1"/>
+          </a:lnRef>
+          <a:fillRef idx="0">
+            <a:schemeClr val="accent1"/>
+          </a:fillRef>
+          <a:effectRef idx="0">
+            <a:schemeClr val="accent1"/>
+          </a:effectRef>
+          <a:fontRef idx="minor">
+            <a:schemeClr val="tx1"/>
+          </a:fontRef>
+        </p:style>
+      </p:cxnSp>
+      <p:sp>
+        <p:nvSpPr>
+          <p:cNvPr id="19" name="Rectangle 13"/>
+          <p:cNvSpPr>
+            <a:spLocks noGrp="1" noRot="1" noChangeAspect="1" noMove="1" noResize="1" noEditPoints="1" noAdjustHandles="1" noChangeArrowheads="1" noChangeShapeType="1" noTextEdit="1"/>
+          </p:cNvSpPr>
+          <p:nvPr>
+            <p:extLst>
+              <p:ext uri="{386F3935-93C4-4BCD-93E2-E3B085C9AB24}">
+                <p16:designElem xmlns:p16="http://schemas.microsoft.com/office/powerpoint/2015/main" val="1"/>
+              </p:ext>
+            </p:extLst>
+          </p:nvPr>
+        </p:nvSpPr>
+        <p:spPr>
+          <a:xfrm>
+            <a:off x="0" y="761999"/>
+            <a:ext cx="1286934" cy="5334001"/>
+          </a:xfrm>
+          <a:prstGeom prst="rect">
+            <a:avLst/>
+          </a:prstGeom>
           <a:solidFill>
-            <a:schemeClr val="bg1"/>
+            <a:schemeClr val="accent1"/>
           </a:solidFill>
           <a:ln>
             <a:noFill/>
           </a:ln>
-          <a:effectLst/>
         </p:spPr>
+        <p:style>
+          <a:lnRef idx="2">
+            <a:schemeClr val="accent1">
+              <a:shade val="50000"/>
+            </a:schemeClr>
+          </a:lnRef>
+          <a:fillRef idx="1">
+            <a:schemeClr val="accent1"/>
+          </a:fillRef>
+          <a:effectRef idx="0">
+            <a:schemeClr val="accent1"/>
+          </a:effectRef>
+          <a:fontRef idx="minor">
+            <a:schemeClr val="lt1"/>
+          </a:fontRef>
+        </p:style>
+      </p:sp>
+      <p:sp>
+        <p:nvSpPr>
+          <p:cNvPr id="16" name="Rectangle 15"/>
+          <p:cNvSpPr>
+            <a:spLocks noGrp="1" noRot="1" noChangeAspect="1" noMove="1" noResize="1" noEditPoints="1" noAdjustHandles="1" noChangeArrowheads="1" noChangeShapeType="1" noTextEdit="1"/>
+          </p:cNvSpPr>
+          <p:nvPr>
+            <p:extLst>
+              <p:ext uri="{386F3935-93C4-4BCD-93E2-E3B085C9AB24}">
+                <p16:designElem xmlns:p16="http://schemas.microsoft.com/office/powerpoint/2015/main" val="1"/>
+              </p:ext>
+            </p:extLst>
+          </p:nvPr>
+        </p:nvSpPr>
+        <p:spPr>
+          <a:xfrm>
+            <a:off x="11685778" y="767825"/>
+            <a:ext cx="508012" cy="5328173"/>
+          </a:xfrm>
+          <a:prstGeom prst="rect">
+            <a:avLst/>
+          </a:prstGeom>
+          <a:solidFill>
+            <a:srgbClr val="C8C8C8">
+              <a:alpha val="50000"/>
+            </a:srgbClr>
+          </a:solidFill>
+          <a:ln>
+            <a:noFill/>
+          </a:ln>
+        </p:spPr>
+        <p:style>
+          <a:lnRef idx="2">
+            <a:schemeClr val="accent1">
+              <a:shade val="50000"/>
+            </a:schemeClr>
+          </a:lnRef>
+          <a:fillRef idx="1">
+            <a:schemeClr val="accent1"/>
+          </a:fillRef>
+          <a:effectRef idx="0">
+            <a:schemeClr val="accent1"/>
+          </a:effectRef>
+          <a:fontRef idx="minor">
+            <a:schemeClr val="lt1"/>
+          </a:fontRef>
+        </p:style>
+        <p:txBody>
+          <a:bodyPr rtlCol="0" anchor="ctr"/>
+          <a:lstStyle/>
+          <a:p>
+            <a:pPr algn="ctr"/>
+            <a:endParaRPr lang="en-US"/>
+          </a:p>
+        </p:txBody>
+      </p:sp>
+      <p:sp>
+        <p:nvSpPr>
+          <p:cNvPr id="3" name="Title 2">
+            <a:extLst>
+              <a:ext uri="{FF2B5EF4-FFF2-40B4-BE49-F238E27FC236}">
+                <a16:creationId xmlns:a16="http://schemas.microsoft.com/office/drawing/2014/main" id="{4A5665C2-CF24-4FDD-8E12-177E5A331057}"/>
+              </a:ext>
+            </a:extLst>
+          </p:cNvPr>
+          <p:cNvSpPr>
+            <a:spLocks noGrp="1"/>
+          </p:cNvSpPr>
+          <p:nvPr>
+            <p:ph type="ctrTitle"/>
+          </p:nvPr>
+        </p:nvSpPr>
+        <p:spPr>
+          <a:xfrm>
+            <a:off x="2439553" y="1083732"/>
+            <a:ext cx="5509628" cy="4690534"/>
+          </a:xfrm>
+        </p:spPr>
+        <p:txBody>
+          <a:bodyPr anchor="ctr">
+            <a:normAutofit/>
+          </a:bodyPr>
+          <a:lstStyle/>
+          <a:p>
+            <a:pPr algn="r"/>
+            <a:r>
+              <a:rPr lang="en-GB" sz="7200" dirty="0">
+                <a:solidFill>
+                  <a:schemeClr val="tx1">
+                    <a:lumMod val="75000"/>
+                    <a:lumOff val="25000"/>
+                  </a:schemeClr>
+                </a:solidFill>
+              </a:rPr>
+              <a:t>   &amp; demo		</a:t>
+            </a:r>
+          </a:p>
+        </p:txBody>
+      </p:sp>
+      <p:sp>
+        <p:nvSpPr>
+          <p:cNvPr id="5" name="Subtitle 4">
+            <a:extLst>
+              <a:ext uri="{FF2B5EF4-FFF2-40B4-BE49-F238E27FC236}">
+                <a16:creationId xmlns:a16="http://schemas.microsoft.com/office/drawing/2014/main" id="{F2B8D1D6-6B10-4E3F-8851-D9CEDDB13C4C}"/>
+              </a:ext>
+            </a:extLst>
+          </p:cNvPr>
+          <p:cNvSpPr>
+            <a:spLocks noGrp="1"/>
+          </p:cNvSpPr>
+          <p:nvPr>
+            <p:ph type="subTitle" idx="1"/>
+          </p:nvPr>
+        </p:nvSpPr>
+        <p:spPr>
+          <a:xfrm>
+            <a:off x="7856389" y="1083732"/>
+            <a:ext cx="3507654" cy="4690534"/>
+          </a:xfrm>
+        </p:spPr>
+        <p:txBody>
+          <a:bodyPr anchor="ctr">
+            <a:normAutofit/>
+          </a:bodyPr>
+          <a:lstStyle/>
+          <a:p>
+            <a:r>
+              <a:rPr lang="en-GB" sz="2800" dirty="0">
+                <a:solidFill>
+                  <a:schemeClr val="tx1">
+                    <a:lumMod val="75000"/>
+                    <a:lumOff val="25000"/>
+                  </a:schemeClr>
+                </a:solidFill>
+              </a:rPr>
+              <a:t>Continuous Integration with Team City</a:t>
+            </a:r>
+          </a:p>
+        </p:txBody>
       </p:sp>
       <p:pic>
         <p:nvPicPr>
-          <p:cNvPr id="4" name="Picture 3" descr="A screenshot of a video game&#10;&#10;Description generated with high confidence"/>
+          <p:cNvPr id="1028" name="Picture 4" descr="https://cdn3.iconfinder.com/data/icons/food-drink/512/Coffee_B-512.png">
+            <a:extLst>
+              <a:ext uri="{FF2B5EF4-FFF2-40B4-BE49-F238E27FC236}">
+                <a16:creationId xmlns:a16="http://schemas.microsoft.com/office/drawing/2014/main" id="{1370659D-323D-4EEB-8EE7-66FACF1EE34E}"/>
+              </a:ext>
+            </a:extLst>
+          </p:cNvPr>
           <p:cNvPicPr>
-            <a:picLocks noChangeAspect="1"/>
+            <a:picLocks noChangeAspect="1" noChangeArrowheads="1"/>
           </p:cNvPicPr>
           <p:nvPr/>
         </p:nvPicPr>
         <p:blipFill>
-          <a:blip r:embed="rId3"/>
+          <a:blip r:embed="rId3" cstate="print">
+            <a:duotone>
+              <a:prstClr val="black"/>
+              <a:schemeClr val="accent3">
+                <a:tint val="45000"/>
+                <a:satMod val="400000"/>
+              </a:schemeClr>
+            </a:duotone>
+            <a:extLst>
+              <a:ext uri="{BEBA8EAE-BF5A-486C-A8C5-ECC9F3942E4B}">
+                <a14:imgProps xmlns:a14="http://schemas.microsoft.com/office/drawing/2010/main">
+                  <a14:imgLayer r:embed="rId4">
+                    <a14:imgEffect>
+                      <a14:saturation sat="0"/>
+                    </a14:imgEffect>
+                  </a14:imgLayer>
+                </a14:imgProps>
+              </a:ext>
+              <a:ext uri="{28A0092B-C50C-407E-A947-70E740481C1C}">
+                <a14:useLocalDpi xmlns:a14="http://schemas.microsoft.com/office/drawing/2010/main" val="0"/>
+              </a:ext>
+            </a:extLst>
+          </a:blip>
+          <a:srcRect/>
           <a:stretch>
             <a:fillRect/>
           </a:stretch>
         </p:blipFill>
-        <p:spPr>
+        <p:spPr bwMode="auto">
           <a:xfrm>
-            <a:off x="2186480" y="643467"/>
-            <a:ext cx="7819040" cy="5571066"/>
+            <a:off x="2454583" y="2681210"/>
+            <a:ext cx="1096136" cy="1096136"/>
           </a:xfrm>
           <a:prstGeom prst="rect">
             <a:avLst/>
           </a:prstGeom>
+          <a:noFill/>
+          <a:extLst>
+            <a:ext uri="{909E8E84-426E-40DD-AFC4-6F175D3DCCD1}">
+              <a14:hiddenFill xmlns:a14="http://schemas.microsoft.com/office/drawing/2010/main">
+                <a:solidFill>
+                  <a:srgbClr val="FFFFFF"/>
+                </a:solidFill>
+              </a14:hiddenFill>
+            </a:ext>
+          </a:extLst>
         </p:spPr>
       </p:pic>
     </p:spTree>
@@ -10931,13 +11263,6 @@
   <p:clrMapOvr>
     <a:masterClrMapping/>
   </p:clrMapOvr>
-  <p:timing>
-    <p:tnLst>
-      <p:par>
-        <p:cTn id="1" dur="indefinite" restart="never" nodeType="tmRoot"/>
-      </p:par>
-    </p:tnLst>
-  </p:timing>
 </p:sld>
 </file>
 
@@ -11872,13 +12197,6 @@
   <p:clrMapOvr>
     <a:masterClrMapping/>
   </p:clrMapOvr>
-  <p:timing>
-    <p:tnLst>
-      <p:par>
-        <p:cTn id="1" dur="indefinite" restart="never" nodeType="tmRoot"/>
-      </p:par>
-    </p:tnLst>
-  </p:timing>
 </p:sld>
 </file>
 
@@ -11982,13 +12300,6 @@
   <p:clrMapOvr>
     <a:masterClrMapping/>
   </p:clrMapOvr>
-  <p:timing>
-    <p:tnLst>
-      <p:par>
-        <p:cTn id="1" dur="indefinite" restart="never" nodeType="tmRoot"/>
-      </p:par>
-    </p:tnLst>
-  </p:timing>
 </p:sld>
 </file>
 
@@ -12068,13 +12379,6 @@
   <p:clrMapOvr>
     <a:masterClrMapping/>
   </p:clrMapOvr>
-  <p:timing>
-    <p:tnLst>
-      <p:par>
-        <p:cTn id="1" dur="indefinite" restart="never" nodeType="tmRoot"/>
-      </p:par>
-    </p:tnLst>
-  </p:timing>
 </p:sld>
 </file>
 
@@ -12342,13 +12646,6 @@
   <p:clrMapOvr>
     <a:masterClrMapping/>
   </p:clrMapOvr>
-  <p:timing>
-    <p:tnLst>
-      <p:par>
-        <p:cTn id="1" dur="indefinite" restart="never" nodeType="tmRoot"/>
-      </p:par>
-    </p:tnLst>
-  </p:timing>
 </p:sld>
 </file>
 
@@ -12614,13 +12911,6 @@
   <p:clrMapOvr>
     <a:masterClrMapping/>
   </p:clrMapOvr>
-  <p:timing>
-    <p:tnLst>
-      <p:par>
-        <p:cTn id="1" dur="indefinite" restart="never" nodeType="tmRoot"/>
-      </p:par>
-    </p:tnLst>
-  </p:timing>
 </p:sld>
 </file>
 
@@ -12722,13 +13012,6 @@
   <p:clrMapOvr>
     <a:masterClrMapping/>
   </p:clrMapOvr>
-  <p:timing>
-    <p:tnLst>
-      <p:par>
-        <p:cTn id="1" dur="indefinite" restart="never" nodeType="tmRoot"/>
-      </p:par>
-    </p:tnLst>
-  </p:timing>
 </p:sld>
 </file>
 
@@ -13029,13 +13312,6 @@
   <p:clrMapOvr>
     <a:masterClrMapping/>
   </p:clrMapOvr>
-  <p:timing>
-    <p:tnLst>
-      <p:par>
-        <p:cTn id="1" dur="indefinite" restart="never" nodeType="tmRoot"/>
-      </p:par>
-    </p:tnLst>
-  </p:timing>
 </p:sld>
 </file>
 
@@ -13388,13 +13664,6 @@
   <p:clrMapOvr>
     <a:masterClrMapping/>
   </p:clrMapOvr>
-  <p:timing>
-    <p:tnLst>
-      <p:par>
-        <p:cTn id="1" dur="indefinite" restart="never" nodeType="tmRoot"/>
-      </p:par>
-    </p:tnLst>
-  </p:timing>
 </p:sld>
 </file>
 

</xml_diff>

<commit_message>
Some animations in the story
</commit_message>
<xml_diff>
--- a/Bootcamp-ContinuousDelivery.pptx
+++ b/Bootcamp-ContinuousDelivery.pptx
@@ -15919,7 +15919,22 @@
           <a:p>
             <a:r>
               <a:rPr lang="en-GB" dirty="0"/>
-              <a:t>Both teams are making changes in the configuration of the environments manually</a:t>
+              <a:t>The red team makes their change and push it all the way up to Prod and it works</a:t>
+            </a:r>
+          </a:p>
+          <a:p>
+            <a:r>
+              <a:rPr lang="en-GB" dirty="0"/>
+              <a:t>The green team does the same, and since the change doesn’t clash with the other team’s changes, it works fine as well</a:t>
+            </a:r>
+          </a:p>
+          <a:p>
+            <a:endParaRPr lang="en-GB" dirty="0"/>
+          </a:p>
+          <a:p>
+            <a:r>
+              <a:rPr lang="en-GB" dirty="0"/>
+              <a:t>But both teams are making changes in the configuration of the environments manually</a:t>
             </a:r>
           </a:p>
           <a:p>
@@ -15929,7 +15944,7 @@
             </a:pPr>
             <a:r>
               <a:rPr lang="en-GB" dirty="0"/>
-              <a:t>Environments start to differ</a:t>
+              <a:t>So they are not keeping the environments in sync</a:t>
             </a:r>
           </a:p>
           <a:p>
@@ -16005,23 +16020,23 @@
               <a:buNone/>
             </a:pPr>
             <a:r>
-              <a:rPr lang="en-GB" dirty="0"/>
+              <a:rPr lang="en-GB" i="1" dirty="0"/>
               <a:t>“This </a:t>
             </a:r>
             <a:r>
-              <a:rPr lang="en-GB" dirty="0" err="1"/>
+              <a:rPr lang="en-GB" i="1" dirty="0" err="1"/>
               <a:t>ain’t</a:t>
             </a:r>
             <a:r>
-              <a:rPr lang="en-GB" dirty="0"/>
+              <a:rPr lang="en-GB" i="1" dirty="0"/>
               <a:t> </a:t>
             </a:r>
             <a:r>
-              <a:rPr lang="en-GB" dirty="0" err="1"/>
+              <a:rPr lang="en-GB" i="1" dirty="0" err="1"/>
               <a:t>gonna</a:t>
             </a:r>
             <a:r>
-              <a:rPr lang="en-GB" dirty="0"/>
+              <a:rPr lang="en-GB" i="1" dirty="0"/>
               <a:t> end well…”</a:t>
             </a:r>
           </a:p>
@@ -21124,7 +21139,7 @@
           <a:p>
             <a:r>
               <a:rPr lang="en-GB" b="0" dirty="0"/>
-              <a:t>And the QA says that before going to Prod, the release has to go to the test environment, where he’ll run some tests</a:t>
+              <a:t>And the QA says that before going to Prod, the release has to go to the test environment, where he’ll run some regression tests</a:t>
             </a:r>
           </a:p>
           <a:p>
@@ -21146,13 +21161,8 @@
           <a:p>
             <a:r>
               <a:rPr lang="en-GB" dirty="0"/>
-              <a:t>But… there’s more stuff to do, they </a:t>
+              <a:t>But… there’s more stuff to do, they need more hands</a:t>
             </a:r>
-            <a:r>
-              <a:rPr lang="en-GB"/>
-              <a:t>need more hands</a:t>
-            </a:r>
-            <a:endParaRPr lang="en-GB" dirty="0"/>
           </a:p>
         </p:txBody>
       </p:sp>
@@ -27414,238 +27424,12 @@
           <a:chExt cx="0" cy="0"/>
         </a:xfrm>
       </p:grpSpPr>
-      <p:sp>
-        <p:nvSpPr>
-          <p:cNvPr id="8" name="Rectangle 7"/>
-          <p:cNvSpPr>
-            <a:spLocks noGrp="1" noRot="1" noChangeAspect="1" noMove="1" noResize="1" noEditPoints="1" noAdjustHandles="1" noChangeArrowheads="1" noChangeShapeType="1" noTextEdit="1"/>
-          </p:cNvSpPr>
-          <p:nvPr>
-            <p:extLst>
-              <p:ext uri="{386F3935-93C4-4BCD-93E2-E3B085C9AB24}">
-                <p16:designElem xmlns:p16="http://schemas.microsoft.com/office/powerpoint/2015/main" val="1"/>
-              </p:ext>
-            </p:extLst>
-          </p:nvPr>
-        </p:nvSpPr>
-        <p:spPr>
-          <a:xfrm>
-            <a:off x="1" y="758952"/>
-            <a:ext cx="3443590" cy="5330952"/>
-          </a:xfrm>
-          <a:prstGeom prst="rect">
-            <a:avLst/>
-          </a:prstGeom>
-          <a:solidFill>
-            <a:schemeClr val="accent1"/>
-          </a:solidFill>
-          <a:ln>
-            <a:noFill/>
-          </a:ln>
-        </p:spPr>
-        <p:style>
-          <a:lnRef idx="2">
-            <a:schemeClr val="accent1">
-              <a:shade val="50000"/>
-            </a:schemeClr>
-          </a:lnRef>
-          <a:fillRef idx="1">
-            <a:schemeClr val="accent1"/>
-          </a:fillRef>
-          <a:effectRef idx="0">
-            <a:schemeClr val="accent1"/>
-          </a:effectRef>
-          <a:fontRef idx="minor">
-            <a:schemeClr val="lt1"/>
-          </a:fontRef>
-        </p:style>
-      </p:sp>
-      <p:sp>
-        <p:nvSpPr>
-          <p:cNvPr id="10" name="Rectangle 9"/>
-          <p:cNvSpPr>
-            <a:spLocks noGrp="1" noRot="1" noChangeAspect="1" noMove="1" noResize="1" noEditPoints="1" noAdjustHandles="1" noChangeArrowheads="1" noChangeShapeType="1" noTextEdit="1"/>
-          </p:cNvSpPr>
-          <p:nvPr>
-            <p:extLst>
-              <p:ext uri="{386F3935-93C4-4BCD-93E2-E3B085C9AB24}">
-                <p16:designElem xmlns:p16="http://schemas.microsoft.com/office/powerpoint/2015/main" val="1"/>
-              </p:ext>
-            </p:extLst>
-          </p:nvPr>
-        </p:nvSpPr>
-        <p:spPr>
-          <a:xfrm>
-            <a:off x="11815864" y="758952"/>
-            <a:ext cx="384048" cy="5330952"/>
-          </a:xfrm>
-          <a:prstGeom prst="rect">
-            <a:avLst/>
-          </a:prstGeom>
-          <a:solidFill>
-            <a:srgbClr val="C8C8C8">
-              <a:alpha val="49804"/>
-            </a:srgbClr>
-          </a:solidFill>
-          <a:ln>
-            <a:noFill/>
-          </a:ln>
-        </p:spPr>
-        <p:style>
-          <a:lnRef idx="2">
-            <a:schemeClr val="accent1">
-              <a:shade val="50000"/>
-            </a:schemeClr>
-          </a:lnRef>
-          <a:fillRef idx="1">
-            <a:schemeClr val="accent1"/>
-          </a:fillRef>
-          <a:effectRef idx="0">
-            <a:schemeClr val="accent1"/>
-          </a:effectRef>
-          <a:fontRef idx="minor">
-            <a:schemeClr val="lt1"/>
-          </a:fontRef>
-        </p:style>
-      </p:sp>
-      <p:sp>
-        <p:nvSpPr>
-          <p:cNvPr id="9" name="Title 1">
+      <p:grpSp>
+        <p:nvGrpSpPr>
+          <p:cNvPr id="48" name="Group 47">
             <a:extLst>
               <a:ext uri="{FF2B5EF4-FFF2-40B4-BE49-F238E27FC236}">
-                <a16:creationId xmlns:a16="http://schemas.microsoft.com/office/drawing/2014/main" id="{519F807E-5958-4995-A227-C4835B3B6E7D}"/>
-              </a:ext>
-            </a:extLst>
-          </p:cNvPr>
-          <p:cNvSpPr txBox="1">
-            <a:spLocks/>
-          </p:cNvSpPr>
-          <p:nvPr/>
-        </p:nvSpPr>
-        <p:spPr>
-          <a:xfrm>
-            <a:off x="252919" y="1123837"/>
-            <a:ext cx="2947482" cy="4601183"/>
-          </a:xfrm>
-          <a:prstGeom prst="rect">
-            <a:avLst/>
-          </a:prstGeom>
-        </p:spPr>
-        <p:txBody>
-          <a:bodyPr>
-            <a:normAutofit/>
-          </a:bodyPr>
-          <a:lstStyle>
-            <a:lvl1pPr algn="l" defTabSz="914400" rtl="0" eaLnBrk="1" latinLnBrk="0" hangingPunct="1">
-              <a:lnSpc>
-                <a:spcPct val="90000"/>
-              </a:lnSpc>
-              <a:spcBef>
-                <a:spcPct val="0"/>
-              </a:spcBef>
-              <a:buNone/>
-              <a:defRPr sz="3600" kern="1200" spc="-60" baseline="0">
-                <a:solidFill>
-                  <a:srgbClr val="FFFFFF"/>
-                </a:solidFill>
-                <a:latin typeface="+mj-lt"/>
-                <a:ea typeface="+mj-ea"/>
-                <a:cs typeface="+mj-cs"/>
-              </a:defRPr>
-            </a:lvl1pPr>
-          </a:lstStyle>
-          <a:p>
-            <a:endParaRPr lang="en-GB" sz="2000" dirty="0"/>
-          </a:p>
-          <a:p>
-            <a:endParaRPr lang="en-GB" sz="2000" dirty="0"/>
-          </a:p>
-          <a:p>
-            <a:endParaRPr lang="en-GB" sz="2000" dirty="0"/>
-          </a:p>
-          <a:p>
-            <a:endParaRPr lang="en-GB" sz="2000" dirty="0"/>
-          </a:p>
-          <a:p>
-            <a:pPr marL="342900" indent="-342900">
-              <a:buFont typeface="Arial" panose="020B0604020202020204" pitchFamily="34" charset="0"/>
-              <a:buChar char="•"/>
-            </a:pPr>
-            <a:endParaRPr lang="en-GB" sz="2000" dirty="0"/>
-          </a:p>
-          <a:p>
-            <a:r>
-              <a:rPr lang="en-GB" sz="2000" dirty="0"/>
-              <a:t>2 teams: red &amp; green</a:t>
-            </a:r>
-          </a:p>
-          <a:p>
-            <a:pPr marL="342900" indent="-342900">
-              <a:buFont typeface="Arial" panose="020B0604020202020204" pitchFamily="34" charset="0"/>
-              <a:buChar char="•"/>
-            </a:pPr>
-            <a:endParaRPr lang="en-GB" sz="2000" dirty="0"/>
-          </a:p>
-          <a:p>
-            <a:r>
-              <a:rPr lang="en-GB" sz="2000" dirty="0"/>
-              <a:t>2 dev servers</a:t>
-            </a:r>
-          </a:p>
-          <a:p>
-            <a:r>
-              <a:rPr lang="en-GB" sz="2000" dirty="0"/>
-              <a:t>2 test server</a:t>
-            </a:r>
-          </a:p>
-          <a:p>
-            <a:r>
-              <a:rPr lang="en-GB" sz="2000" dirty="0"/>
-              <a:t>1 prod server </a:t>
-            </a:r>
-          </a:p>
-          <a:p>
-            <a:r>
-              <a:rPr lang="en-GB" sz="2000" dirty="0"/>
-              <a:t>   (still accessible to </a:t>
-            </a:r>
-            <a:r>
-              <a:rPr lang="en-GB" sz="2000" dirty="0" err="1"/>
-              <a:t>devs</a:t>
-            </a:r>
-            <a:r>
-              <a:rPr lang="en-GB" sz="2000" dirty="0"/>
-              <a:t>)</a:t>
-            </a:r>
-          </a:p>
-          <a:p>
-            <a:pPr marL="342900" indent="-342900">
-              <a:buFont typeface="Arial" panose="020B0604020202020204" pitchFamily="34" charset="0"/>
-              <a:buChar char="•"/>
-            </a:pPr>
-            <a:endParaRPr lang="en-GB" sz="2000" dirty="0"/>
-          </a:p>
-          <a:p>
-            <a:r>
-              <a:rPr lang="en-GB" sz="2000" dirty="0"/>
-              <a:t>1 source control</a:t>
-            </a:r>
-          </a:p>
-          <a:p>
-            <a:pPr marL="342900" indent="-342900">
-              <a:buFont typeface="Arial" panose="020B0604020202020204" pitchFamily="34" charset="0"/>
-              <a:buChar char="•"/>
-            </a:pPr>
-            <a:endParaRPr lang="en-GB" sz="2000" dirty="0"/>
-          </a:p>
-        </p:txBody>
-      </p:sp>
-      <p:grpSp>
-        <p:nvGrpSpPr>
-          <p:cNvPr id="15" name="Group 14">
-            <a:extLst>
-              <a:ext uri="{FF2B5EF4-FFF2-40B4-BE49-F238E27FC236}">
-                <a16:creationId xmlns:a16="http://schemas.microsoft.com/office/drawing/2014/main" id="{7E1A4E4E-93AD-4FAC-9DF9-4B8433B0FFF4}"/>
+                <a16:creationId xmlns:a16="http://schemas.microsoft.com/office/drawing/2014/main" id="{0E67137E-755C-493A-A620-386ECAEC3C29}"/>
               </a:ext>
             </a:extLst>
           </p:cNvPr>
@@ -28613,58 +28397,6 @@
         </p:sp>
         <p:sp>
           <p:nvSpPr>
-            <p:cNvPr id="31" name="Arrow: Up 30">
-              <a:extLst>
-                <a:ext uri="{FF2B5EF4-FFF2-40B4-BE49-F238E27FC236}">
-                  <a16:creationId xmlns:a16="http://schemas.microsoft.com/office/drawing/2014/main" id="{3AA873C2-F0BA-48B9-AF87-DA2E69846E86}"/>
-                </a:ext>
-              </a:extLst>
-            </p:cNvPr>
-            <p:cNvSpPr/>
-            <p:nvPr/>
-          </p:nvSpPr>
-          <p:spPr>
-            <a:xfrm>
-              <a:off x="8235691" y="2916837"/>
-              <a:ext cx="209550" cy="222123"/>
-            </a:xfrm>
-            <a:prstGeom prst="upArrow">
-              <a:avLst/>
-            </a:prstGeom>
-            <a:solidFill>
-              <a:schemeClr val="accent6"/>
-            </a:solidFill>
-            <a:ln>
-              <a:noFill/>
-            </a:ln>
-          </p:spPr>
-          <p:style>
-            <a:lnRef idx="2">
-              <a:schemeClr val="accent1">
-                <a:shade val="50000"/>
-              </a:schemeClr>
-            </a:lnRef>
-            <a:fillRef idx="1">
-              <a:schemeClr val="accent1"/>
-            </a:fillRef>
-            <a:effectRef idx="0">
-              <a:schemeClr val="accent1"/>
-            </a:effectRef>
-            <a:fontRef idx="minor">
-              <a:schemeClr val="lt1"/>
-            </a:fontRef>
-          </p:style>
-          <p:txBody>
-            <a:bodyPr rtlCol="0" anchor="ctr"/>
-            <a:lstStyle/>
-            <a:p>
-              <a:pPr algn="ctr"/>
-              <a:endParaRPr lang="en-GB"/>
-            </a:p>
-          </p:txBody>
-        </p:sp>
-        <p:sp>
-          <p:nvSpPr>
             <p:cNvPr id="34" name="Arrow: Up 33">
               <a:extLst>
                 <a:ext uri="{FF2B5EF4-FFF2-40B4-BE49-F238E27FC236}">
@@ -28740,220 +28472,6 @@
             </a:solidFill>
             <a:ln>
               <a:noFill/>
-            </a:ln>
-          </p:spPr>
-          <p:style>
-            <a:lnRef idx="2">
-              <a:schemeClr val="accent1">
-                <a:shade val="50000"/>
-              </a:schemeClr>
-            </a:lnRef>
-            <a:fillRef idx="1">
-              <a:schemeClr val="accent1"/>
-            </a:fillRef>
-            <a:effectRef idx="0">
-              <a:schemeClr val="accent1"/>
-            </a:effectRef>
-            <a:fontRef idx="minor">
-              <a:schemeClr val="lt1"/>
-            </a:fontRef>
-          </p:style>
-          <p:txBody>
-            <a:bodyPr rtlCol="0" anchor="ctr"/>
-            <a:lstStyle/>
-            <a:p>
-              <a:pPr algn="ctr"/>
-              <a:endParaRPr lang="en-GB"/>
-            </a:p>
-          </p:txBody>
-        </p:sp>
-        <p:sp>
-          <p:nvSpPr>
-            <p:cNvPr id="36" name="Rectangle 35">
-              <a:extLst>
-                <a:ext uri="{FF2B5EF4-FFF2-40B4-BE49-F238E27FC236}">
-                  <a16:creationId xmlns:a16="http://schemas.microsoft.com/office/drawing/2014/main" id="{26FEF1A7-33E7-4A10-A076-AA78678CC593}"/>
-                </a:ext>
-              </a:extLst>
-            </p:cNvPr>
-            <p:cNvSpPr/>
-            <p:nvPr/>
-          </p:nvSpPr>
-          <p:spPr>
-            <a:xfrm>
-              <a:off x="6425702" y="1192375"/>
-              <a:ext cx="498258" cy="45719"/>
-            </a:xfrm>
-            <a:prstGeom prst="rect">
-              <a:avLst/>
-            </a:prstGeom>
-            <a:solidFill>
-              <a:srgbClr val="FF0000"/>
-            </a:solidFill>
-            <a:ln>
-              <a:noFill/>
-            </a:ln>
-          </p:spPr>
-          <p:style>
-            <a:lnRef idx="2">
-              <a:schemeClr val="accent1">
-                <a:shade val="50000"/>
-              </a:schemeClr>
-            </a:lnRef>
-            <a:fillRef idx="1">
-              <a:schemeClr val="accent1"/>
-            </a:fillRef>
-            <a:effectRef idx="0">
-              <a:schemeClr val="accent1"/>
-            </a:effectRef>
-            <a:fontRef idx="minor">
-              <a:schemeClr val="lt1"/>
-            </a:fontRef>
-          </p:style>
-          <p:txBody>
-            <a:bodyPr rtlCol="0" anchor="ctr"/>
-            <a:lstStyle/>
-            <a:p>
-              <a:pPr algn="ctr"/>
-              <a:endParaRPr lang="en-GB"/>
-            </a:p>
-          </p:txBody>
-        </p:sp>
-        <p:sp>
-          <p:nvSpPr>
-            <p:cNvPr id="37" name="Rectangle 36">
-              <a:extLst>
-                <a:ext uri="{FF2B5EF4-FFF2-40B4-BE49-F238E27FC236}">
-                  <a16:creationId xmlns:a16="http://schemas.microsoft.com/office/drawing/2014/main" id="{D437877E-9A7B-4B80-A91B-3EB94FC37399}"/>
-                </a:ext>
-              </a:extLst>
-            </p:cNvPr>
-            <p:cNvSpPr/>
-            <p:nvPr/>
-          </p:nvSpPr>
-          <p:spPr>
-            <a:xfrm flipH="1">
-              <a:off x="6441569" y="789099"/>
-              <a:ext cx="163892" cy="238083"/>
-            </a:xfrm>
-            <a:prstGeom prst="rect">
-              <a:avLst/>
-            </a:prstGeom>
-            <a:solidFill>
-              <a:schemeClr val="accent6"/>
-            </a:solidFill>
-            <a:ln>
-              <a:noFill/>
-            </a:ln>
-          </p:spPr>
-          <p:style>
-            <a:lnRef idx="2">
-              <a:schemeClr val="accent1">
-                <a:shade val="50000"/>
-              </a:schemeClr>
-            </a:lnRef>
-            <a:fillRef idx="1">
-              <a:schemeClr val="accent1"/>
-            </a:fillRef>
-            <a:effectRef idx="0">
-              <a:schemeClr val="accent1"/>
-            </a:effectRef>
-            <a:fontRef idx="minor">
-              <a:schemeClr val="lt1"/>
-            </a:fontRef>
-          </p:style>
-          <p:txBody>
-            <a:bodyPr rtlCol="0" anchor="ctr"/>
-            <a:lstStyle/>
-            <a:p>
-              <a:pPr algn="ctr"/>
-              <a:endParaRPr lang="en-GB"/>
-            </a:p>
-          </p:txBody>
-        </p:sp>
-        <p:sp>
-          <p:nvSpPr>
-            <p:cNvPr id="39" name="Rectangle 38">
-              <a:extLst>
-                <a:ext uri="{FF2B5EF4-FFF2-40B4-BE49-F238E27FC236}">
-                  <a16:creationId xmlns:a16="http://schemas.microsoft.com/office/drawing/2014/main" id="{D1D89E2E-3804-492C-9382-6F7B4663602C}"/>
-                </a:ext>
-              </a:extLst>
-            </p:cNvPr>
-            <p:cNvSpPr/>
-            <p:nvPr/>
-          </p:nvSpPr>
-          <p:spPr>
-            <a:xfrm>
-              <a:off x="4833661" y="3820582"/>
-              <a:ext cx="498258" cy="45719"/>
-            </a:xfrm>
-            <a:prstGeom prst="rect">
-              <a:avLst/>
-            </a:prstGeom>
-            <a:solidFill>
-              <a:srgbClr val="FF0000"/>
-            </a:solidFill>
-            <a:ln>
-              <a:solidFill>
-                <a:srgbClr val="C00000"/>
-              </a:solidFill>
-            </a:ln>
-          </p:spPr>
-          <p:style>
-            <a:lnRef idx="2">
-              <a:schemeClr val="accent1">
-                <a:shade val="50000"/>
-              </a:schemeClr>
-            </a:lnRef>
-            <a:fillRef idx="1">
-              <a:schemeClr val="accent1"/>
-            </a:fillRef>
-            <a:effectRef idx="0">
-              <a:schemeClr val="accent1"/>
-            </a:effectRef>
-            <a:fontRef idx="minor">
-              <a:schemeClr val="lt1"/>
-            </a:fontRef>
-          </p:style>
-          <p:txBody>
-            <a:bodyPr rtlCol="0" anchor="ctr"/>
-            <a:lstStyle/>
-            <a:p>
-              <a:pPr algn="ctr"/>
-              <a:endParaRPr lang="en-GB"/>
-            </a:p>
-          </p:txBody>
-        </p:sp>
-        <p:sp>
-          <p:nvSpPr>
-            <p:cNvPr id="40" name="Rectangle 39">
-              <a:extLst>
-                <a:ext uri="{FF2B5EF4-FFF2-40B4-BE49-F238E27FC236}">
-                  <a16:creationId xmlns:a16="http://schemas.microsoft.com/office/drawing/2014/main" id="{6D7472CB-9226-4B5F-840C-9F9D00298009}"/>
-                </a:ext>
-              </a:extLst>
-            </p:cNvPr>
-            <p:cNvSpPr/>
-            <p:nvPr/>
-          </p:nvSpPr>
-          <p:spPr>
-            <a:xfrm flipH="1">
-              <a:off x="8143043" y="3379448"/>
-              <a:ext cx="163892" cy="238083"/>
-            </a:xfrm>
-            <a:prstGeom prst="rect">
-              <a:avLst/>
-            </a:prstGeom>
-            <a:solidFill>
-              <a:schemeClr val="accent6"/>
-            </a:solidFill>
-            <a:ln>
-              <a:solidFill>
-                <a:schemeClr val="accent6">
-                  <a:lumMod val="50000"/>
-                </a:schemeClr>
-              </a:solidFill>
             </a:ln>
           </p:spPr>
           <p:style>
@@ -29242,116 +28760,6 @@
             </a:p>
           </p:txBody>
         </p:sp>
-        <p:sp>
-          <p:nvSpPr>
-            <p:cNvPr id="46" name="Rectangle 45">
-              <a:extLst>
-                <a:ext uri="{FF2B5EF4-FFF2-40B4-BE49-F238E27FC236}">
-                  <a16:creationId xmlns:a16="http://schemas.microsoft.com/office/drawing/2014/main" id="{1BE1D9BF-FE28-4BBB-9EF4-29B23762B696}"/>
-                </a:ext>
-              </a:extLst>
-            </p:cNvPr>
-            <p:cNvSpPr/>
-            <p:nvPr/>
-          </p:nvSpPr>
-          <p:spPr>
-            <a:xfrm>
-              <a:off x="4807871" y="2643713"/>
-              <a:ext cx="498258" cy="45719"/>
-            </a:xfrm>
-            <a:prstGeom prst="rect">
-              <a:avLst/>
-            </a:prstGeom>
-            <a:solidFill>
-              <a:srgbClr val="FF0000"/>
-            </a:solidFill>
-            <a:ln>
-              <a:solidFill>
-                <a:srgbClr val="C00000"/>
-              </a:solidFill>
-            </a:ln>
-          </p:spPr>
-          <p:style>
-            <a:lnRef idx="2">
-              <a:schemeClr val="accent1">
-                <a:shade val="50000"/>
-              </a:schemeClr>
-            </a:lnRef>
-            <a:fillRef idx="1">
-              <a:schemeClr val="accent1"/>
-            </a:fillRef>
-            <a:effectRef idx="0">
-              <a:schemeClr val="accent1"/>
-            </a:effectRef>
-            <a:fontRef idx="minor">
-              <a:schemeClr val="lt1"/>
-            </a:fontRef>
-          </p:style>
-          <p:txBody>
-            <a:bodyPr rtlCol="0" anchor="ctr"/>
-            <a:lstStyle/>
-            <a:p>
-              <a:pPr algn="ctr"/>
-              <a:endParaRPr lang="en-GB"/>
-            </a:p>
-          </p:txBody>
-        </p:sp>
-        <p:sp>
-          <p:nvSpPr>
-            <p:cNvPr id="47" name="Rectangle 46">
-              <a:extLst>
-                <a:ext uri="{FF2B5EF4-FFF2-40B4-BE49-F238E27FC236}">
-                  <a16:creationId xmlns:a16="http://schemas.microsoft.com/office/drawing/2014/main" id="{087C8057-2037-4BE9-A0DC-7B5C46BBFCA7}"/>
-                </a:ext>
-              </a:extLst>
-            </p:cNvPr>
-            <p:cNvSpPr/>
-            <p:nvPr/>
-          </p:nvSpPr>
-          <p:spPr>
-            <a:xfrm flipH="1">
-              <a:off x="8145413" y="2216000"/>
-              <a:ext cx="163892" cy="238083"/>
-            </a:xfrm>
-            <a:prstGeom prst="rect">
-              <a:avLst/>
-            </a:prstGeom>
-            <a:solidFill>
-              <a:schemeClr val="accent6"/>
-            </a:solidFill>
-            <a:ln>
-              <a:solidFill>
-                <a:schemeClr val="accent6">
-                  <a:lumMod val="50000"/>
-                </a:schemeClr>
-              </a:solidFill>
-            </a:ln>
-          </p:spPr>
-          <p:style>
-            <a:lnRef idx="2">
-              <a:schemeClr val="accent1">
-                <a:shade val="50000"/>
-              </a:schemeClr>
-            </a:lnRef>
-            <a:fillRef idx="1">
-              <a:schemeClr val="accent1"/>
-            </a:fillRef>
-            <a:effectRef idx="0">
-              <a:schemeClr val="accent1"/>
-            </a:effectRef>
-            <a:fontRef idx="minor">
-              <a:schemeClr val="lt1"/>
-            </a:fontRef>
-          </p:style>
-          <p:txBody>
-            <a:bodyPr rtlCol="0" anchor="ctr"/>
-            <a:lstStyle/>
-            <a:p>
-              <a:pPr algn="ctr"/>
-              <a:endParaRPr lang="en-GB"/>
-            </a:p>
-          </p:txBody>
-        </p:sp>
         <p:pic>
           <p:nvPicPr>
             <p:cNvPr id="2054" name="Picture 6" descr="https://d30y9cdsu7xlg0.cloudfront.net/png/140329-200.png">
@@ -29400,36 +28808,62 @@
           </p:spPr>
         </p:pic>
       </p:grpSp>
-    </p:spTree>
-    <p:extLst>
-      <p:ext uri="{BB962C8B-B14F-4D97-AF65-F5344CB8AC3E}">
-        <p14:creationId xmlns:p14="http://schemas.microsoft.com/office/powerpoint/2010/main" val="4040140057"/>
-      </p:ext>
-    </p:extLst>
-  </p:cSld>
-  <p:clrMapOvr>
-    <a:masterClrMapping/>
-  </p:clrMapOvr>
-</p:sld>
-</file>
-
-<file path=ppt/slides/slide13.xml><?xml version="1.0" encoding="utf-8"?>
-<p:sld xmlns:a="http://schemas.openxmlformats.org/drawingml/2006/main" xmlns:r="http://schemas.openxmlformats.org/officeDocument/2006/relationships" xmlns:p="http://schemas.openxmlformats.org/presentationml/2006/main">
-  <p:cSld>
-    <p:spTree>
-      <p:nvGrpSpPr>
-        <p:cNvPr id="1" name=""/>
-        <p:cNvGrpSpPr/>
-        <p:nvPr/>
-      </p:nvGrpSpPr>
-      <p:grpSpPr>
-        <a:xfrm>
-          <a:off x="0" y="0"/>
-          <a:ext cx="0" cy="0"/>
-          <a:chOff x="0" y="0"/>
-          <a:chExt cx="0" cy="0"/>
-        </a:xfrm>
-      </p:grpSpPr>
+      <p:sp>
+        <p:nvSpPr>
+          <p:cNvPr id="40" name="Rectangle 39">
+            <a:extLst>
+              <a:ext uri="{FF2B5EF4-FFF2-40B4-BE49-F238E27FC236}">
+                <a16:creationId xmlns:a16="http://schemas.microsoft.com/office/drawing/2014/main" id="{6D7472CB-9226-4B5F-840C-9F9D00298009}"/>
+              </a:ext>
+            </a:extLst>
+          </p:cNvPr>
+          <p:cNvSpPr/>
+          <p:nvPr/>
+        </p:nvSpPr>
+        <p:spPr>
+          <a:xfrm flipH="1">
+            <a:off x="8143043" y="3379448"/>
+            <a:ext cx="163892" cy="238083"/>
+          </a:xfrm>
+          <a:prstGeom prst="rect">
+            <a:avLst/>
+          </a:prstGeom>
+          <a:solidFill>
+            <a:schemeClr val="accent6"/>
+          </a:solidFill>
+          <a:ln>
+            <a:solidFill>
+              <a:schemeClr val="accent6">
+                <a:lumMod val="50000"/>
+              </a:schemeClr>
+            </a:solidFill>
+          </a:ln>
+        </p:spPr>
+        <p:style>
+          <a:lnRef idx="2">
+            <a:schemeClr val="accent1">
+              <a:shade val="50000"/>
+            </a:schemeClr>
+          </a:lnRef>
+          <a:fillRef idx="1">
+            <a:schemeClr val="accent1"/>
+          </a:fillRef>
+          <a:effectRef idx="0">
+            <a:schemeClr val="accent1"/>
+          </a:effectRef>
+          <a:fontRef idx="minor">
+            <a:schemeClr val="lt1"/>
+          </a:fontRef>
+        </p:style>
+        <p:txBody>
+          <a:bodyPr rtlCol="0" anchor="ctr"/>
+          <a:lstStyle/>
+          <a:p>
+            <a:pPr algn="ctr"/>
+            <a:endParaRPr lang="en-GB"/>
+          </a:p>
+        </p:txBody>
+      </p:sp>
       <p:sp>
         <p:nvSpPr>
           <p:cNvPr id="8" name="Rectangle 7"/>
@@ -29656,12 +29090,670 @@
           </a:p>
         </p:txBody>
       </p:sp>
+      <p:sp>
+        <p:nvSpPr>
+          <p:cNvPr id="31" name="Arrow: Up 30">
+            <a:extLst>
+              <a:ext uri="{FF2B5EF4-FFF2-40B4-BE49-F238E27FC236}">
+                <a16:creationId xmlns:a16="http://schemas.microsoft.com/office/drawing/2014/main" id="{3AA873C2-F0BA-48B9-AF87-DA2E69846E86}"/>
+              </a:ext>
+            </a:extLst>
+          </p:cNvPr>
+          <p:cNvSpPr/>
+          <p:nvPr/>
+        </p:nvSpPr>
+        <p:spPr>
+          <a:xfrm>
+            <a:off x="8235691" y="2916837"/>
+            <a:ext cx="209550" cy="222123"/>
+          </a:xfrm>
+          <a:prstGeom prst="upArrow">
+            <a:avLst/>
+          </a:prstGeom>
+          <a:solidFill>
+            <a:schemeClr val="accent6"/>
+          </a:solidFill>
+          <a:ln>
+            <a:noFill/>
+          </a:ln>
+        </p:spPr>
+        <p:style>
+          <a:lnRef idx="2">
+            <a:schemeClr val="accent1">
+              <a:shade val="50000"/>
+            </a:schemeClr>
+          </a:lnRef>
+          <a:fillRef idx="1">
+            <a:schemeClr val="accent1"/>
+          </a:fillRef>
+          <a:effectRef idx="0">
+            <a:schemeClr val="accent1"/>
+          </a:effectRef>
+          <a:fontRef idx="minor">
+            <a:schemeClr val="lt1"/>
+          </a:fontRef>
+        </p:style>
+        <p:txBody>
+          <a:bodyPr rtlCol="0" anchor="ctr"/>
+          <a:lstStyle/>
+          <a:p>
+            <a:pPr algn="ctr"/>
+            <a:endParaRPr lang="en-GB"/>
+          </a:p>
+        </p:txBody>
+      </p:sp>
+      <p:sp>
+        <p:nvSpPr>
+          <p:cNvPr id="36" name="Rectangle 35">
+            <a:extLst>
+              <a:ext uri="{FF2B5EF4-FFF2-40B4-BE49-F238E27FC236}">
+                <a16:creationId xmlns:a16="http://schemas.microsoft.com/office/drawing/2014/main" id="{26FEF1A7-33E7-4A10-A076-AA78678CC593}"/>
+              </a:ext>
+            </a:extLst>
+          </p:cNvPr>
+          <p:cNvSpPr/>
+          <p:nvPr/>
+        </p:nvSpPr>
+        <p:spPr>
+          <a:xfrm>
+            <a:off x="6425702" y="1192375"/>
+            <a:ext cx="498258" cy="45719"/>
+          </a:xfrm>
+          <a:prstGeom prst="rect">
+            <a:avLst/>
+          </a:prstGeom>
+          <a:solidFill>
+            <a:srgbClr val="FF0000"/>
+          </a:solidFill>
+          <a:ln>
+            <a:noFill/>
+          </a:ln>
+        </p:spPr>
+        <p:style>
+          <a:lnRef idx="2">
+            <a:schemeClr val="accent1">
+              <a:shade val="50000"/>
+            </a:schemeClr>
+          </a:lnRef>
+          <a:fillRef idx="1">
+            <a:schemeClr val="accent1"/>
+          </a:fillRef>
+          <a:effectRef idx="0">
+            <a:schemeClr val="accent1"/>
+          </a:effectRef>
+          <a:fontRef idx="minor">
+            <a:schemeClr val="lt1"/>
+          </a:fontRef>
+        </p:style>
+        <p:txBody>
+          <a:bodyPr rtlCol="0" anchor="ctr"/>
+          <a:lstStyle/>
+          <a:p>
+            <a:pPr algn="ctr"/>
+            <a:endParaRPr lang="en-GB"/>
+          </a:p>
+        </p:txBody>
+      </p:sp>
+      <p:sp>
+        <p:nvSpPr>
+          <p:cNvPr id="37" name="Rectangle 36">
+            <a:extLst>
+              <a:ext uri="{FF2B5EF4-FFF2-40B4-BE49-F238E27FC236}">
+                <a16:creationId xmlns:a16="http://schemas.microsoft.com/office/drawing/2014/main" id="{D437877E-9A7B-4B80-A91B-3EB94FC37399}"/>
+              </a:ext>
+            </a:extLst>
+          </p:cNvPr>
+          <p:cNvSpPr/>
+          <p:nvPr/>
+        </p:nvSpPr>
+        <p:spPr>
+          <a:xfrm flipH="1">
+            <a:off x="6441569" y="789099"/>
+            <a:ext cx="163892" cy="238083"/>
+          </a:xfrm>
+          <a:prstGeom prst="rect">
+            <a:avLst/>
+          </a:prstGeom>
+          <a:solidFill>
+            <a:schemeClr val="accent6"/>
+          </a:solidFill>
+          <a:ln>
+            <a:noFill/>
+          </a:ln>
+        </p:spPr>
+        <p:style>
+          <a:lnRef idx="2">
+            <a:schemeClr val="accent1">
+              <a:shade val="50000"/>
+            </a:schemeClr>
+          </a:lnRef>
+          <a:fillRef idx="1">
+            <a:schemeClr val="accent1"/>
+          </a:fillRef>
+          <a:effectRef idx="0">
+            <a:schemeClr val="accent1"/>
+          </a:effectRef>
+          <a:fontRef idx="minor">
+            <a:schemeClr val="lt1"/>
+          </a:fontRef>
+        </p:style>
+        <p:txBody>
+          <a:bodyPr rtlCol="0" anchor="ctr"/>
+          <a:lstStyle/>
+          <a:p>
+            <a:pPr algn="ctr"/>
+            <a:endParaRPr lang="en-GB"/>
+          </a:p>
+        </p:txBody>
+      </p:sp>
+      <p:sp>
+        <p:nvSpPr>
+          <p:cNvPr id="39" name="Rectangle 38">
+            <a:extLst>
+              <a:ext uri="{FF2B5EF4-FFF2-40B4-BE49-F238E27FC236}">
+                <a16:creationId xmlns:a16="http://schemas.microsoft.com/office/drawing/2014/main" id="{D1D89E2E-3804-492C-9382-6F7B4663602C}"/>
+              </a:ext>
+            </a:extLst>
+          </p:cNvPr>
+          <p:cNvSpPr/>
+          <p:nvPr/>
+        </p:nvSpPr>
+        <p:spPr>
+          <a:xfrm>
+            <a:off x="4833661" y="3820582"/>
+            <a:ext cx="498258" cy="45719"/>
+          </a:xfrm>
+          <a:prstGeom prst="rect">
+            <a:avLst/>
+          </a:prstGeom>
+          <a:solidFill>
+            <a:srgbClr val="FF0000"/>
+          </a:solidFill>
+          <a:ln>
+            <a:solidFill>
+              <a:srgbClr val="C00000"/>
+            </a:solidFill>
+          </a:ln>
+        </p:spPr>
+        <p:style>
+          <a:lnRef idx="2">
+            <a:schemeClr val="accent1">
+              <a:shade val="50000"/>
+            </a:schemeClr>
+          </a:lnRef>
+          <a:fillRef idx="1">
+            <a:schemeClr val="accent1"/>
+          </a:fillRef>
+          <a:effectRef idx="0">
+            <a:schemeClr val="accent1"/>
+          </a:effectRef>
+          <a:fontRef idx="minor">
+            <a:schemeClr val="lt1"/>
+          </a:fontRef>
+        </p:style>
+        <p:txBody>
+          <a:bodyPr rtlCol="0" anchor="ctr"/>
+          <a:lstStyle/>
+          <a:p>
+            <a:pPr algn="ctr"/>
+            <a:endParaRPr lang="en-GB"/>
+          </a:p>
+        </p:txBody>
+      </p:sp>
+      <p:sp>
+        <p:nvSpPr>
+          <p:cNvPr id="46" name="Rectangle 45">
+            <a:extLst>
+              <a:ext uri="{FF2B5EF4-FFF2-40B4-BE49-F238E27FC236}">
+                <a16:creationId xmlns:a16="http://schemas.microsoft.com/office/drawing/2014/main" id="{1BE1D9BF-FE28-4BBB-9EF4-29B23762B696}"/>
+              </a:ext>
+            </a:extLst>
+          </p:cNvPr>
+          <p:cNvSpPr/>
+          <p:nvPr/>
+        </p:nvSpPr>
+        <p:spPr>
+          <a:xfrm>
+            <a:off x="4807871" y="2643713"/>
+            <a:ext cx="498258" cy="45719"/>
+          </a:xfrm>
+          <a:prstGeom prst="rect">
+            <a:avLst/>
+          </a:prstGeom>
+          <a:solidFill>
+            <a:srgbClr val="FF0000"/>
+          </a:solidFill>
+          <a:ln>
+            <a:solidFill>
+              <a:srgbClr val="C00000"/>
+            </a:solidFill>
+          </a:ln>
+        </p:spPr>
+        <p:style>
+          <a:lnRef idx="2">
+            <a:schemeClr val="accent1">
+              <a:shade val="50000"/>
+            </a:schemeClr>
+          </a:lnRef>
+          <a:fillRef idx="1">
+            <a:schemeClr val="accent1"/>
+          </a:fillRef>
+          <a:effectRef idx="0">
+            <a:schemeClr val="accent1"/>
+          </a:effectRef>
+          <a:fontRef idx="minor">
+            <a:schemeClr val="lt1"/>
+          </a:fontRef>
+        </p:style>
+        <p:txBody>
+          <a:bodyPr rtlCol="0" anchor="ctr"/>
+          <a:lstStyle/>
+          <a:p>
+            <a:pPr algn="ctr"/>
+            <a:endParaRPr lang="en-GB"/>
+          </a:p>
+        </p:txBody>
+      </p:sp>
+      <p:sp>
+        <p:nvSpPr>
+          <p:cNvPr id="47" name="Rectangle 46">
+            <a:extLst>
+              <a:ext uri="{FF2B5EF4-FFF2-40B4-BE49-F238E27FC236}">
+                <a16:creationId xmlns:a16="http://schemas.microsoft.com/office/drawing/2014/main" id="{087C8057-2037-4BE9-A0DC-7B5C46BBFCA7}"/>
+              </a:ext>
+            </a:extLst>
+          </p:cNvPr>
+          <p:cNvSpPr/>
+          <p:nvPr/>
+        </p:nvSpPr>
+        <p:spPr>
+          <a:xfrm flipH="1">
+            <a:off x="8145413" y="2216000"/>
+            <a:ext cx="163892" cy="238083"/>
+          </a:xfrm>
+          <a:prstGeom prst="rect">
+            <a:avLst/>
+          </a:prstGeom>
+          <a:solidFill>
+            <a:schemeClr val="accent6"/>
+          </a:solidFill>
+          <a:ln>
+            <a:solidFill>
+              <a:schemeClr val="accent6">
+                <a:lumMod val="50000"/>
+              </a:schemeClr>
+            </a:solidFill>
+          </a:ln>
+        </p:spPr>
+        <p:style>
+          <a:lnRef idx="2">
+            <a:schemeClr val="accent1">
+              <a:shade val="50000"/>
+            </a:schemeClr>
+          </a:lnRef>
+          <a:fillRef idx="1">
+            <a:schemeClr val="accent1"/>
+          </a:fillRef>
+          <a:effectRef idx="0">
+            <a:schemeClr val="accent1"/>
+          </a:effectRef>
+          <a:fontRef idx="minor">
+            <a:schemeClr val="lt1"/>
+          </a:fontRef>
+        </p:style>
+        <p:txBody>
+          <a:bodyPr rtlCol="0" anchor="ctr"/>
+          <a:lstStyle/>
+          <a:p>
+            <a:pPr algn="ctr"/>
+            <a:endParaRPr lang="en-GB"/>
+          </a:p>
+        </p:txBody>
+      </p:sp>
+    </p:spTree>
+    <p:extLst>
+      <p:ext uri="{BB962C8B-B14F-4D97-AF65-F5344CB8AC3E}">
+        <p14:creationId xmlns:p14="http://schemas.microsoft.com/office/powerpoint/2010/main" val="4040140057"/>
+      </p:ext>
+    </p:extLst>
+  </p:cSld>
+  <p:clrMapOvr>
+    <a:masterClrMapping/>
+  </p:clrMapOvr>
+  <p:timing>
+    <p:tnLst>
+      <p:par>
+        <p:cTn id="1" dur="indefinite" restart="never" nodeType="tmRoot">
+          <p:childTnLst>
+            <p:seq concurrent="1" nextAc="seek">
+              <p:cTn id="2" dur="indefinite" nodeType="mainSeq">
+                <p:childTnLst>
+                  <p:par>
+                    <p:cTn id="3" fill="hold">
+                      <p:stCondLst>
+                        <p:cond delay="indefinite"/>
+                      </p:stCondLst>
+                      <p:childTnLst>
+                        <p:par>
+                          <p:cTn id="4" fill="hold">
+                            <p:stCondLst>
+                              <p:cond delay="0"/>
+                            </p:stCondLst>
+                            <p:childTnLst>
+                              <p:par>
+                                <p:cTn id="5" presetID="1" presetClass="entr" presetSubtype="0" fill="hold" grpId="0" nodeType="clickEffect">
+                                  <p:stCondLst>
+                                    <p:cond delay="0"/>
+                                  </p:stCondLst>
+                                  <p:childTnLst>
+                                    <p:set>
+                                      <p:cBhvr>
+                                        <p:cTn id="6" dur="1" fill="hold">
+                                          <p:stCondLst>
+                                            <p:cond delay="0"/>
+                                          </p:stCondLst>
+                                        </p:cTn>
+                                        <p:tgtEl>
+                                          <p:spTgt spid="39"/>
+                                        </p:tgtEl>
+                                        <p:attrNameLst>
+                                          <p:attrName>style.visibility</p:attrName>
+                                        </p:attrNameLst>
+                                      </p:cBhvr>
+                                      <p:to>
+                                        <p:strVal val="visible"/>
+                                      </p:to>
+                                    </p:set>
+                                  </p:childTnLst>
+                                </p:cTn>
+                              </p:par>
+                            </p:childTnLst>
+                          </p:cTn>
+                        </p:par>
+                      </p:childTnLst>
+                    </p:cTn>
+                  </p:par>
+                  <p:par>
+                    <p:cTn id="7" fill="hold">
+                      <p:stCondLst>
+                        <p:cond delay="indefinite"/>
+                      </p:stCondLst>
+                      <p:childTnLst>
+                        <p:par>
+                          <p:cTn id="8" fill="hold">
+                            <p:stCondLst>
+                              <p:cond delay="0"/>
+                            </p:stCondLst>
+                            <p:childTnLst>
+                              <p:par>
+                                <p:cTn id="9" presetID="1" presetClass="entr" presetSubtype="0" fill="hold" grpId="0" nodeType="clickEffect">
+                                  <p:stCondLst>
+                                    <p:cond delay="0"/>
+                                  </p:stCondLst>
+                                  <p:childTnLst>
+                                    <p:set>
+                                      <p:cBhvr>
+                                        <p:cTn id="10" dur="1" fill="hold">
+                                          <p:stCondLst>
+                                            <p:cond delay="0"/>
+                                          </p:stCondLst>
+                                        </p:cTn>
+                                        <p:tgtEl>
+                                          <p:spTgt spid="46"/>
+                                        </p:tgtEl>
+                                        <p:attrNameLst>
+                                          <p:attrName>style.visibility</p:attrName>
+                                        </p:attrNameLst>
+                                      </p:cBhvr>
+                                      <p:to>
+                                        <p:strVal val="visible"/>
+                                      </p:to>
+                                    </p:set>
+                                  </p:childTnLst>
+                                </p:cTn>
+                              </p:par>
+                            </p:childTnLst>
+                          </p:cTn>
+                        </p:par>
+                      </p:childTnLst>
+                    </p:cTn>
+                  </p:par>
+                  <p:par>
+                    <p:cTn id="11" fill="hold">
+                      <p:stCondLst>
+                        <p:cond delay="indefinite"/>
+                      </p:stCondLst>
+                      <p:childTnLst>
+                        <p:par>
+                          <p:cTn id="12" fill="hold">
+                            <p:stCondLst>
+                              <p:cond delay="0"/>
+                            </p:stCondLst>
+                            <p:childTnLst>
+                              <p:par>
+                                <p:cTn id="13" presetID="1" presetClass="entr" presetSubtype="0" fill="hold" grpId="0" nodeType="clickEffect">
+                                  <p:stCondLst>
+                                    <p:cond delay="0"/>
+                                  </p:stCondLst>
+                                  <p:childTnLst>
+                                    <p:set>
+                                      <p:cBhvr>
+                                        <p:cTn id="14" dur="1" fill="hold">
+                                          <p:stCondLst>
+                                            <p:cond delay="0"/>
+                                          </p:stCondLst>
+                                        </p:cTn>
+                                        <p:tgtEl>
+                                          <p:spTgt spid="36"/>
+                                        </p:tgtEl>
+                                        <p:attrNameLst>
+                                          <p:attrName>style.visibility</p:attrName>
+                                        </p:attrNameLst>
+                                      </p:cBhvr>
+                                      <p:to>
+                                        <p:strVal val="visible"/>
+                                      </p:to>
+                                    </p:set>
+                                  </p:childTnLst>
+                                </p:cTn>
+                              </p:par>
+                            </p:childTnLst>
+                          </p:cTn>
+                        </p:par>
+                      </p:childTnLst>
+                    </p:cTn>
+                  </p:par>
+                  <p:par>
+                    <p:cTn id="15" fill="hold">
+                      <p:stCondLst>
+                        <p:cond delay="indefinite"/>
+                      </p:stCondLst>
+                      <p:childTnLst>
+                        <p:par>
+                          <p:cTn id="16" fill="hold">
+                            <p:stCondLst>
+                              <p:cond delay="0"/>
+                            </p:stCondLst>
+                            <p:childTnLst>
+                              <p:par>
+                                <p:cTn id="17" presetID="1" presetClass="entr" presetSubtype="0" fill="hold" grpId="0" nodeType="clickEffect">
+                                  <p:stCondLst>
+                                    <p:cond delay="0"/>
+                                  </p:stCondLst>
+                                  <p:childTnLst>
+                                    <p:set>
+                                      <p:cBhvr>
+                                        <p:cTn id="18" dur="1" fill="hold">
+                                          <p:stCondLst>
+                                            <p:cond delay="0"/>
+                                          </p:stCondLst>
+                                        </p:cTn>
+                                        <p:tgtEl>
+                                          <p:spTgt spid="40"/>
+                                        </p:tgtEl>
+                                        <p:attrNameLst>
+                                          <p:attrName>style.visibility</p:attrName>
+                                        </p:attrNameLst>
+                                      </p:cBhvr>
+                                      <p:to>
+                                        <p:strVal val="visible"/>
+                                      </p:to>
+                                    </p:set>
+                                  </p:childTnLst>
+                                </p:cTn>
+                              </p:par>
+                            </p:childTnLst>
+                          </p:cTn>
+                        </p:par>
+                      </p:childTnLst>
+                    </p:cTn>
+                  </p:par>
+                  <p:par>
+                    <p:cTn id="19" fill="hold">
+                      <p:stCondLst>
+                        <p:cond delay="indefinite"/>
+                      </p:stCondLst>
+                      <p:childTnLst>
+                        <p:par>
+                          <p:cTn id="20" fill="hold">
+                            <p:stCondLst>
+                              <p:cond delay="0"/>
+                            </p:stCondLst>
+                            <p:childTnLst>
+                              <p:par>
+                                <p:cTn id="21" presetID="1" presetClass="entr" presetSubtype="0" fill="hold" grpId="0" nodeType="clickEffect">
+                                  <p:stCondLst>
+                                    <p:cond delay="0"/>
+                                  </p:stCondLst>
+                                  <p:childTnLst>
+                                    <p:set>
+                                      <p:cBhvr>
+                                        <p:cTn id="22" dur="1" fill="hold">
+                                          <p:stCondLst>
+                                            <p:cond delay="0"/>
+                                          </p:stCondLst>
+                                        </p:cTn>
+                                        <p:tgtEl>
+                                          <p:spTgt spid="47"/>
+                                        </p:tgtEl>
+                                        <p:attrNameLst>
+                                          <p:attrName>style.visibility</p:attrName>
+                                        </p:attrNameLst>
+                                      </p:cBhvr>
+                                      <p:to>
+                                        <p:strVal val="visible"/>
+                                      </p:to>
+                                    </p:set>
+                                  </p:childTnLst>
+                                </p:cTn>
+                              </p:par>
+                            </p:childTnLst>
+                          </p:cTn>
+                        </p:par>
+                      </p:childTnLst>
+                    </p:cTn>
+                  </p:par>
+                  <p:par>
+                    <p:cTn id="23" fill="hold">
+                      <p:stCondLst>
+                        <p:cond delay="indefinite"/>
+                      </p:stCondLst>
+                      <p:childTnLst>
+                        <p:par>
+                          <p:cTn id="24" fill="hold">
+                            <p:stCondLst>
+                              <p:cond delay="0"/>
+                            </p:stCondLst>
+                            <p:childTnLst>
+                              <p:par>
+                                <p:cTn id="25" presetID="1" presetClass="entr" presetSubtype="0" fill="hold" grpId="0" nodeType="clickEffect">
+                                  <p:stCondLst>
+                                    <p:cond delay="0"/>
+                                  </p:stCondLst>
+                                  <p:childTnLst>
+                                    <p:set>
+                                      <p:cBhvr>
+                                        <p:cTn id="26" dur="1" fill="hold">
+                                          <p:stCondLst>
+                                            <p:cond delay="0"/>
+                                          </p:stCondLst>
+                                        </p:cTn>
+                                        <p:tgtEl>
+                                          <p:spTgt spid="37"/>
+                                        </p:tgtEl>
+                                        <p:attrNameLst>
+                                          <p:attrName>style.visibility</p:attrName>
+                                        </p:attrNameLst>
+                                      </p:cBhvr>
+                                      <p:to>
+                                        <p:strVal val="visible"/>
+                                      </p:to>
+                                    </p:set>
+                                  </p:childTnLst>
+                                </p:cTn>
+                              </p:par>
+                            </p:childTnLst>
+                          </p:cTn>
+                        </p:par>
+                      </p:childTnLst>
+                    </p:cTn>
+                  </p:par>
+                </p:childTnLst>
+              </p:cTn>
+              <p:prevCondLst>
+                <p:cond evt="onPrev" delay="0">
+                  <p:tgtEl>
+                    <p:sldTgt/>
+                  </p:tgtEl>
+                </p:cond>
+              </p:prevCondLst>
+              <p:nextCondLst>
+                <p:cond evt="onNext" delay="0">
+                  <p:tgtEl>
+                    <p:sldTgt/>
+                  </p:tgtEl>
+                </p:cond>
+              </p:nextCondLst>
+            </p:seq>
+          </p:childTnLst>
+        </p:cTn>
+      </p:par>
+    </p:tnLst>
+    <p:bldLst>
+      <p:bldP spid="40" grpId="0" animBg="1"/>
+      <p:bldP spid="36" grpId="0" animBg="1"/>
+      <p:bldP spid="37" grpId="0" animBg="1"/>
+      <p:bldP spid="39" grpId="0" animBg="1"/>
+      <p:bldP spid="46" grpId="0" animBg="1"/>
+      <p:bldP spid="47" grpId="0" animBg="1"/>
+    </p:bldLst>
+  </p:timing>
+</p:sld>
+</file>
+
+<file path=ppt/slides/slide13.xml><?xml version="1.0" encoding="utf-8"?>
+<p:sld xmlns:a="http://schemas.openxmlformats.org/drawingml/2006/main" xmlns:r="http://schemas.openxmlformats.org/officeDocument/2006/relationships" xmlns:p="http://schemas.openxmlformats.org/presentationml/2006/main">
+  <p:cSld>
+    <p:spTree>
+      <p:nvGrpSpPr>
+        <p:cNvPr id="1" name=""/>
+        <p:cNvGrpSpPr/>
+        <p:nvPr/>
+      </p:nvGrpSpPr>
+      <p:grpSpPr>
+        <a:xfrm>
+          <a:off x="0" y="0"/>
+          <a:ext cx="0" cy="0"/>
+          <a:chOff x="0" y="0"/>
+          <a:chExt cx="0" cy="0"/>
+        </a:xfrm>
+      </p:grpSpPr>
       <p:grpSp>
         <p:nvGrpSpPr>
-          <p:cNvPr id="6" name="Group 5">
+          <p:cNvPr id="14" name="Group 13">
             <a:extLst>
               <a:ext uri="{FF2B5EF4-FFF2-40B4-BE49-F238E27FC236}">
-                <a16:creationId xmlns:a16="http://schemas.microsoft.com/office/drawing/2014/main" id="{36429ECC-C4B3-493B-A843-22EB33D390F0}"/>
+                <a16:creationId xmlns:a16="http://schemas.microsoft.com/office/drawing/2014/main" id="{82B6FD19-4998-48E3-AD9D-92ABF05029DB}"/>
               </a:ext>
             </a:extLst>
           </p:cNvPr>
@@ -30577,58 +30669,6 @@
         </p:pic>
         <p:sp>
           <p:nvSpPr>
-            <p:cNvPr id="30" name="Arrow: Up 29">
-              <a:extLst>
-                <a:ext uri="{FF2B5EF4-FFF2-40B4-BE49-F238E27FC236}">
-                  <a16:creationId xmlns:a16="http://schemas.microsoft.com/office/drawing/2014/main" id="{0104FFDB-1F58-4F47-949E-E0F9C14441C6}"/>
-                </a:ext>
-              </a:extLst>
-            </p:cNvPr>
-            <p:cNvSpPr/>
-            <p:nvPr/>
-          </p:nvSpPr>
-          <p:spPr>
-            <a:xfrm>
-              <a:off x="4950636" y="2924294"/>
-              <a:ext cx="209550" cy="222123"/>
-            </a:xfrm>
-            <a:prstGeom prst="upArrow">
-              <a:avLst/>
-            </a:prstGeom>
-            <a:solidFill>
-              <a:srgbClr val="FF0000"/>
-            </a:solidFill>
-            <a:ln>
-              <a:noFill/>
-            </a:ln>
-          </p:spPr>
-          <p:style>
-            <a:lnRef idx="2">
-              <a:schemeClr val="accent1">
-                <a:shade val="50000"/>
-              </a:schemeClr>
-            </a:lnRef>
-            <a:fillRef idx="1">
-              <a:schemeClr val="accent1"/>
-            </a:fillRef>
-            <a:effectRef idx="0">
-              <a:schemeClr val="accent1"/>
-            </a:effectRef>
-            <a:fontRef idx="minor">
-              <a:schemeClr val="lt1"/>
-            </a:fontRef>
-          </p:style>
-          <p:txBody>
-            <a:bodyPr rtlCol="0" anchor="ctr"/>
-            <a:lstStyle/>
-            <a:p>
-              <a:pPr algn="ctr"/>
-              <a:endParaRPr lang="en-GB"/>
-            </a:p>
-          </p:txBody>
-        </p:sp>
-        <p:sp>
-          <p:nvSpPr>
             <p:cNvPr id="31" name="Arrow: Up 30">
               <a:extLst>
                 <a:ext uri="{FF2B5EF4-FFF2-40B4-BE49-F238E27FC236}">
@@ -30805,58 +30845,6 @@
             </a:prstGeom>
             <a:solidFill>
               <a:srgbClr val="FF0000"/>
-            </a:solidFill>
-            <a:ln>
-              <a:noFill/>
-            </a:ln>
-          </p:spPr>
-          <p:style>
-            <a:lnRef idx="2">
-              <a:schemeClr val="accent1">
-                <a:shade val="50000"/>
-              </a:schemeClr>
-            </a:lnRef>
-            <a:fillRef idx="1">
-              <a:schemeClr val="accent1"/>
-            </a:fillRef>
-            <a:effectRef idx="0">
-              <a:schemeClr val="accent1"/>
-            </a:effectRef>
-            <a:fontRef idx="minor">
-              <a:schemeClr val="lt1"/>
-            </a:fontRef>
-          </p:style>
-          <p:txBody>
-            <a:bodyPr rtlCol="0" anchor="ctr"/>
-            <a:lstStyle/>
-            <a:p>
-              <a:pPr algn="ctr"/>
-              <a:endParaRPr lang="en-GB"/>
-            </a:p>
-          </p:txBody>
-        </p:sp>
-        <p:sp>
-          <p:nvSpPr>
-            <p:cNvPr id="37" name="Rectangle 36">
-              <a:extLst>
-                <a:ext uri="{FF2B5EF4-FFF2-40B4-BE49-F238E27FC236}">
-                  <a16:creationId xmlns:a16="http://schemas.microsoft.com/office/drawing/2014/main" id="{D437877E-9A7B-4B80-A91B-3EB94FC37399}"/>
-                </a:ext>
-              </a:extLst>
-            </p:cNvPr>
-            <p:cNvSpPr/>
-            <p:nvPr/>
-          </p:nvSpPr>
-          <p:spPr>
-            <a:xfrm flipH="1">
-              <a:off x="6441569" y="789099"/>
-              <a:ext cx="163892" cy="238083"/>
-            </a:xfrm>
-            <a:prstGeom prst="rect">
-              <a:avLst/>
-            </a:prstGeom>
-            <a:solidFill>
-              <a:schemeClr val="accent6"/>
             </a:solidFill>
             <a:ln>
               <a:noFill/>
@@ -31156,58 +31144,6 @@
         </p:pic>
         <p:sp>
           <p:nvSpPr>
-            <p:cNvPr id="44" name="Arrow: Up 43">
-              <a:extLst>
-                <a:ext uri="{FF2B5EF4-FFF2-40B4-BE49-F238E27FC236}">
-                  <a16:creationId xmlns:a16="http://schemas.microsoft.com/office/drawing/2014/main" id="{FB18C0AB-3CF6-4038-BBD1-1D0380B1C3FA}"/>
-                </a:ext>
-              </a:extLst>
-            </p:cNvPr>
-            <p:cNvSpPr/>
-            <p:nvPr/>
-          </p:nvSpPr>
-          <p:spPr>
-            <a:xfrm>
-              <a:off x="4966406" y="1773418"/>
-              <a:ext cx="209550" cy="222123"/>
-            </a:xfrm>
-            <a:prstGeom prst="upArrow">
-              <a:avLst/>
-            </a:prstGeom>
-            <a:solidFill>
-              <a:srgbClr val="FF0000"/>
-            </a:solidFill>
-            <a:ln>
-              <a:noFill/>
-            </a:ln>
-          </p:spPr>
-          <p:style>
-            <a:lnRef idx="2">
-              <a:schemeClr val="accent1">
-                <a:shade val="50000"/>
-              </a:schemeClr>
-            </a:lnRef>
-            <a:fillRef idx="1">
-              <a:schemeClr val="accent1"/>
-            </a:fillRef>
-            <a:effectRef idx="0">
-              <a:schemeClr val="accent1"/>
-            </a:effectRef>
-            <a:fontRef idx="minor">
-              <a:schemeClr val="lt1"/>
-            </a:fontRef>
-          </p:style>
-          <p:txBody>
-            <a:bodyPr rtlCol="0" anchor="ctr"/>
-            <a:lstStyle/>
-            <a:p>
-              <a:pPr algn="ctr"/>
-              <a:endParaRPr lang="en-GB"/>
-            </a:p>
-          </p:txBody>
-        </p:sp>
-        <p:sp>
-          <p:nvSpPr>
             <p:cNvPr id="45" name="Arrow: Up 44">
               <a:extLst>
                 <a:ext uri="{FF2B5EF4-FFF2-40B4-BE49-F238E27FC236}">
@@ -31368,169 +31304,551 @@
             </a:p>
           </p:txBody>
         </p:sp>
-        <p:sp>
-          <p:nvSpPr>
-            <p:cNvPr id="48" name="Rectangle 47">
-              <a:extLst>
-                <a:ext uri="{FF2B5EF4-FFF2-40B4-BE49-F238E27FC236}">
-                  <a16:creationId xmlns:a16="http://schemas.microsoft.com/office/drawing/2014/main" id="{4F450AF6-0ED9-49AB-954F-32F63C68547B}"/>
-                </a:ext>
-              </a:extLst>
-            </p:cNvPr>
-            <p:cNvSpPr/>
-            <p:nvPr/>
-          </p:nvSpPr>
-          <p:spPr>
-            <a:xfrm rot="5400000">
-              <a:off x="4860313" y="3486470"/>
-              <a:ext cx="325072" cy="257339"/>
-            </a:xfrm>
-            <a:prstGeom prst="rect">
-              <a:avLst/>
-            </a:prstGeom>
+      </p:grpSp>
+      <p:sp>
+        <p:nvSpPr>
+          <p:cNvPr id="48" name="Rectangle 47">
+            <a:extLst>
+              <a:ext uri="{FF2B5EF4-FFF2-40B4-BE49-F238E27FC236}">
+                <a16:creationId xmlns:a16="http://schemas.microsoft.com/office/drawing/2014/main" id="{4F450AF6-0ED9-49AB-954F-32F63C68547B}"/>
+              </a:ext>
+            </a:extLst>
+          </p:cNvPr>
+          <p:cNvSpPr/>
+          <p:nvPr/>
+        </p:nvSpPr>
+        <p:spPr>
+          <a:xfrm rot="5400000">
+            <a:off x="4860313" y="3486470"/>
+            <a:ext cx="325072" cy="257339"/>
+          </a:xfrm>
+          <a:prstGeom prst="rect">
+            <a:avLst/>
+          </a:prstGeom>
+          <a:solidFill>
+            <a:srgbClr val="FF0000"/>
+          </a:solidFill>
+          <a:ln>
             <a:solidFill>
-              <a:srgbClr val="FF0000"/>
+              <a:srgbClr val="C00000"/>
             </a:solidFill>
-            <a:ln>
-              <a:solidFill>
-                <a:srgbClr val="C00000"/>
-              </a:solidFill>
-            </a:ln>
-          </p:spPr>
-          <p:style>
-            <a:lnRef idx="2">
-              <a:schemeClr val="accent1">
-                <a:shade val="50000"/>
-              </a:schemeClr>
-            </a:lnRef>
-            <a:fillRef idx="1">
-              <a:schemeClr val="accent1"/>
-            </a:fillRef>
-            <a:effectRef idx="0">
-              <a:schemeClr val="accent1"/>
-            </a:effectRef>
-            <a:fontRef idx="minor">
-              <a:schemeClr val="lt1"/>
-            </a:fontRef>
-          </p:style>
-          <p:txBody>
-            <a:bodyPr rtlCol="0" anchor="ctr"/>
-            <a:lstStyle/>
-            <a:p>
-              <a:pPr algn="ctr"/>
-              <a:endParaRPr lang="en-GB"/>
-            </a:p>
-          </p:txBody>
-        </p:sp>
-        <p:sp>
-          <p:nvSpPr>
-            <p:cNvPr id="49" name="Rectangle 48">
-              <a:extLst>
-                <a:ext uri="{FF2B5EF4-FFF2-40B4-BE49-F238E27FC236}">
-                  <a16:creationId xmlns:a16="http://schemas.microsoft.com/office/drawing/2014/main" id="{6CC78781-269A-4CE7-8326-D315CE12A8A9}"/>
-                </a:ext>
-              </a:extLst>
-            </p:cNvPr>
-            <p:cNvSpPr/>
-            <p:nvPr/>
-          </p:nvSpPr>
-          <p:spPr>
-            <a:xfrm rot="5400000">
-              <a:off x="4838308" y="2281959"/>
-              <a:ext cx="325072" cy="257339"/>
-            </a:xfrm>
-            <a:prstGeom prst="rect">
-              <a:avLst/>
-            </a:prstGeom>
+          </a:ln>
+        </p:spPr>
+        <p:style>
+          <a:lnRef idx="2">
+            <a:schemeClr val="accent1">
+              <a:shade val="50000"/>
+            </a:schemeClr>
+          </a:lnRef>
+          <a:fillRef idx="1">
+            <a:schemeClr val="accent1"/>
+          </a:fillRef>
+          <a:effectRef idx="0">
+            <a:schemeClr val="accent1"/>
+          </a:effectRef>
+          <a:fontRef idx="minor">
+            <a:schemeClr val="lt1"/>
+          </a:fontRef>
+        </p:style>
+        <p:txBody>
+          <a:bodyPr rtlCol="0" anchor="ctr"/>
+          <a:lstStyle/>
+          <a:p>
+            <a:pPr algn="ctr"/>
+            <a:endParaRPr lang="en-GB"/>
+          </a:p>
+        </p:txBody>
+      </p:sp>
+      <p:sp>
+        <p:nvSpPr>
+          <p:cNvPr id="49" name="Rectangle 48">
+            <a:extLst>
+              <a:ext uri="{FF2B5EF4-FFF2-40B4-BE49-F238E27FC236}">
+                <a16:creationId xmlns:a16="http://schemas.microsoft.com/office/drawing/2014/main" id="{6CC78781-269A-4CE7-8326-D315CE12A8A9}"/>
+              </a:ext>
+            </a:extLst>
+          </p:cNvPr>
+          <p:cNvSpPr/>
+          <p:nvPr/>
+        </p:nvSpPr>
+        <p:spPr>
+          <a:xfrm rot="5400000">
+            <a:off x="4838308" y="2281959"/>
+            <a:ext cx="325072" cy="257339"/>
+          </a:xfrm>
+          <a:prstGeom prst="rect">
+            <a:avLst/>
+          </a:prstGeom>
+          <a:solidFill>
+            <a:srgbClr val="FF0000"/>
+          </a:solidFill>
+          <a:ln>
             <a:solidFill>
-              <a:srgbClr val="FF0000"/>
+              <a:srgbClr val="C00000"/>
             </a:solidFill>
-            <a:ln>
-              <a:solidFill>
-                <a:srgbClr val="C00000"/>
-              </a:solidFill>
-            </a:ln>
-          </p:spPr>
-          <p:style>
-            <a:lnRef idx="2">
-              <a:schemeClr val="accent1">
-                <a:shade val="50000"/>
-              </a:schemeClr>
-            </a:lnRef>
-            <a:fillRef idx="1">
-              <a:schemeClr val="accent1"/>
-            </a:fillRef>
-            <a:effectRef idx="0">
-              <a:schemeClr val="accent1"/>
-            </a:effectRef>
-            <a:fontRef idx="minor">
-              <a:schemeClr val="lt1"/>
-            </a:fontRef>
-          </p:style>
-          <p:txBody>
-            <a:bodyPr rtlCol="0" anchor="ctr"/>
-            <a:lstStyle/>
-            <a:p>
-              <a:pPr algn="ctr"/>
-              <a:endParaRPr lang="en-GB"/>
-            </a:p>
-          </p:txBody>
-        </p:sp>
-        <p:sp>
-          <p:nvSpPr>
-            <p:cNvPr id="50" name="Rectangle 49">
-              <a:extLst>
-                <a:ext uri="{FF2B5EF4-FFF2-40B4-BE49-F238E27FC236}">
-                  <a16:creationId xmlns:a16="http://schemas.microsoft.com/office/drawing/2014/main" id="{B95838F6-5D69-4387-8A5B-DAE1DE25FC64}"/>
-                </a:ext>
-              </a:extLst>
-            </p:cNvPr>
-            <p:cNvSpPr/>
-            <p:nvPr/>
-          </p:nvSpPr>
-          <p:spPr>
-            <a:xfrm rot="5400000">
-              <a:off x="6452654" y="874826"/>
-              <a:ext cx="325072" cy="257339"/>
-            </a:xfrm>
-            <a:prstGeom prst="rect">
-              <a:avLst/>
-            </a:prstGeom>
+          </a:ln>
+        </p:spPr>
+        <p:style>
+          <a:lnRef idx="2">
+            <a:schemeClr val="accent1">
+              <a:shade val="50000"/>
+            </a:schemeClr>
+          </a:lnRef>
+          <a:fillRef idx="1">
+            <a:schemeClr val="accent1"/>
+          </a:fillRef>
+          <a:effectRef idx="0">
+            <a:schemeClr val="accent1"/>
+          </a:effectRef>
+          <a:fontRef idx="minor">
+            <a:schemeClr val="lt1"/>
+          </a:fontRef>
+        </p:style>
+        <p:txBody>
+          <a:bodyPr rtlCol="0" anchor="ctr"/>
+          <a:lstStyle/>
+          <a:p>
+            <a:pPr algn="ctr"/>
+            <a:endParaRPr lang="en-GB"/>
+          </a:p>
+        </p:txBody>
+      </p:sp>
+      <p:sp>
+        <p:nvSpPr>
+          <p:cNvPr id="50" name="Rectangle 49">
+            <a:extLst>
+              <a:ext uri="{FF2B5EF4-FFF2-40B4-BE49-F238E27FC236}">
+                <a16:creationId xmlns:a16="http://schemas.microsoft.com/office/drawing/2014/main" id="{B95838F6-5D69-4387-8A5B-DAE1DE25FC64}"/>
+              </a:ext>
+            </a:extLst>
+          </p:cNvPr>
+          <p:cNvSpPr/>
+          <p:nvPr/>
+        </p:nvSpPr>
+        <p:spPr>
+          <a:xfrm rot="5400000">
+            <a:off x="6452654" y="874826"/>
+            <a:ext cx="325072" cy="257339"/>
+          </a:xfrm>
+          <a:prstGeom prst="rect">
+            <a:avLst/>
+          </a:prstGeom>
+          <a:solidFill>
+            <a:srgbClr val="FF0000"/>
+          </a:solidFill>
+          <a:ln>
             <a:solidFill>
-              <a:srgbClr val="FF0000"/>
+              <a:srgbClr val="C00000"/>
             </a:solidFill>
-            <a:ln>
-              <a:solidFill>
-                <a:srgbClr val="C00000"/>
-              </a:solidFill>
-            </a:ln>
-          </p:spPr>
-          <p:style>
-            <a:lnRef idx="2">
-              <a:schemeClr val="accent1">
-                <a:shade val="50000"/>
-              </a:schemeClr>
-            </a:lnRef>
-            <a:fillRef idx="1">
-              <a:schemeClr val="accent1"/>
-            </a:fillRef>
-            <a:effectRef idx="0">
-              <a:schemeClr val="accent1"/>
-            </a:effectRef>
-            <a:fontRef idx="minor">
-              <a:schemeClr val="lt1"/>
-            </a:fontRef>
-          </p:style>
-          <p:txBody>
-            <a:bodyPr rtlCol="0" anchor="ctr"/>
-            <a:lstStyle/>
-            <a:p>
-              <a:pPr algn="ctr"/>
-              <a:endParaRPr lang="en-GB"/>
-            </a:p>
-          </p:txBody>
-        </p:sp>
-      </p:grpSp>
+          </a:ln>
+        </p:spPr>
+        <p:style>
+          <a:lnRef idx="2">
+            <a:schemeClr val="accent1">
+              <a:shade val="50000"/>
+            </a:schemeClr>
+          </a:lnRef>
+          <a:fillRef idx="1">
+            <a:schemeClr val="accent1"/>
+          </a:fillRef>
+          <a:effectRef idx="0">
+            <a:schemeClr val="accent1"/>
+          </a:effectRef>
+          <a:fontRef idx="minor">
+            <a:schemeClr val="lt1"/>
+          </a:fontRef>
+        </p:style>
+        <p:txBody>
+          <a:bodyPr rtlCol="0" anchor="ctr"/>
+          <a:lstStyle/>
+          <a:p>
+            <a:pPr algn="ctr"/>
+            <a:endParaRPr lang="en-GB"/>
+          </a:p>
+        </p:txBody>
+      </p:sp>
+      <p:sp>
+        <p:nvSpPr>
+          <p:cNvPr id="8" name="Rectangle 7"/>
+          <p:cNvSpPr>
+            <a:spLocks noGrp="1" noRot="1" noChangeAspect="1" noMove="1" noResize="1" noEditPoints="1" noAdjustHandles="1" noChangeArrowheads="1" noChangeShapeType="1" noTextEdit="1"/>
+          </p:cNvSpPr>
+          <p:nvPr>
+            <p:extLst>
+              <p:ext uri="{386F3935-93C4-4BCD-93E2-E3B085C9AB24}">
+                <p16:designElem xmlns:p16="http://schemas.microsoft.com/office/powerpoint/2015/main" val="1"/>
+              </p:ext>
+            </p:extLst>
+          </p:nvPr>
+        </p:nvSpPr>
+        <p:spPr>
+          <a:xfrm>
+            <a:off x="1" y="758952"/>
+            <a:ext cx="3443590" cy="5330952"/>
+          </a:xfrm>
+          <a:prstGeom prst="rect">
+            <a:avLst/>
+          </a:prstGeom>
+          <a:solidFill>
+            <a:schemeClr val="accent1"/>
+          </a:solidFill>
+          <a:ln>
+            <a:noFill/>
+          </a:ln>
+        </p:spPr>
+        <p:style>
+          <a:lnRef idx="2">
+            <a:schemeClr val="accent1">
+              <a:shade val="50000"/>
+            </a:schemeClr>
+          </a:lnRef>
+          <a:fillRef idx="1">
+            <a:schemeClr val="accent1"/>
+          </a:fillRef>
+          <a:effectRef idx="0">
+            <a:schemeClr val="accent1"/>
+          </a:effectRef>
+          <a:fontRef idx="minor">
+            <a:schemeClr val="lt1"/>
+          </a:fontRef>
+        </p:style>
+      </p:sp>
+      <p:sp>
+        <p:nvSpPr>
+          <p:cNvPr id="10" name="Rectangle 9"/>
+          <p:cNvSpPr>
+            <a:spLocks noGrp="1" noRot="1" noChangeAspect="1" noMove="1" noResize="1" noEditPoints="1" noAdjustHandles="1" noChangeArrowheads="1" noChangeShapeType="1" noTextEdit="1"/>
+          </p:cNvSpPr>
+          <p:nvPr>
+            <p:extLst>
+              <p:ext uri="{386F3935-93C4-4BCD-93E2-E3B085C9AB24}">
+                <p16:designElem xmlns:p16="http://schemas.microsoft.com/office/powerpoint/2015/main" val="1"/>
+              </p:ext>
+            </p:extLst>
+          </p:nvPr>
+        </p:nvSpPr>
+        <p:spPr>
+          <a:xfrm>
+            <a:off x="11815864" y="758952"/>
+            <a:ext cx="384048" cy="5330952"/>
+          </a:xfrm>
+          <a:prstGeom prst="rect">
+            <a:avLst/>
+          </a:prstGeom>
+          <a:solidFill>
+            <a:srgbClr val="C8C8C8">
+              <a:alpha val="49804"/>
+            </a:srgbClr>
+          </a:solidFill>
+          <a:ln>
+            <a:noFill/>
+          </a:ln>
+        </p:spPr>
+        <p:style>
+          <a:lnRef idx="2">
+            <a:schemeClr val="accent1">
+              <a:shade val="50000"/>
+            </a:schemeClr>
+          </a:lnRef>
+          <a:fillRef idx="1">
+            <a:schemeClr val="accent1"/>
+          </a:fillRef>
+          <a:effectRef idx="0">
+            <a:schemeClr val="accent1"/>
+          </a:effectRef>
+          <a:fontRef idx="minor">
+            <a:schemeClr val="lt1"/>
+          </a:fontRef>
+        </p:style>
+      </p:sp>
+      <p:sp>
+        <p:nvSpPr>
+          <p:cNvPr id="9" name="Title 1">
+            <a:extLst>
+              <a:ext uri="{FF2B5EF4-FFF2-40B4-BE49-F238E27FC236}">
+                <a16:creationId xmlns:a16="http://schemas.microsoft.com/office/drawing/2014/main" id="{519F807E-5958-4995-A227-C4835B3B6E7D}"/>
+              </a:ext>
+            </a:extLst>
+          </p:cNvPr>
+          <p:cNvSpPr txBox="1">
+            <a:spLocks/>
+          </p:cNvSpPr>
+          <p:nvPr/>
+        </p:nvSpPr>
+        <p:spPr>
+          <a:xfrm>
+            <a:off x="252919" y="1123837"/>
+            <a:ext cx="2947482" cy="4601183"/>
+          </a:xfrm>
+          <a:prstGeom prst="rect">
+            <a:avLst/>
+          </a:prstGeom>
+        </p:spPr>
+        <p:txBody>
+          <a:bodyPr>
+            <a:normAutofit/>
+          </a:bodyPr>
+          <a:lstStyle>
+            <a:lvl1pPr algn="l" defTabSz="914400" rtl="0" eaLnBrk="1" latinLnBrk="0" hangingPunct="1">
+              <a:lnSpc>
+                <a:spcPct val="90000"/>
+              </a:lnSpc>
+              <a:spcBef>
+                <a:spcPct val="0"/>
+              </a:spcBef>
+              <a:buNone/>
+              <a:defRPr sz="3600" kern="1200" spc="-60" baseline="0">
+                <a:solidFill>
+                  <a:srgbClr val="FFFFFF"/>
+                </a:solidFill>
+                <a:latin typeface="+mj-lt"/>
+                <a:ea typeface="+mj-ea"/>
+                <a:cs typeface="+mj-cs"/>
+              </a:defRPr>
+            </a:lvl1pPr>
+          </a:lstStyle>
+          <a:p>
+            <a:endParaRPr lang="en-GB" sz="2000" dirty="0"/>
+          </a:p>
+          <a:p>
+            <a:endParaRPr lang="en-GB" sz="2000" dirty="0"/>
+          </a:p>
+          <a:p>
+            <a:endParaRPr lang="en-GB" sz="2000" dirty="0"/>
+          </a:p>
+          <a:p>
+            <a:endParaRPr lang="en-GB" sz="2000" dirty="0"/>
+          </a:p>
+          <a:p>
+            <a:pPr marL="342900" indent="-342900">
+              <a:buFont typeface="Arial" panose="020B0604020202020204" pitchFamily="34" charset="0"/>
+              <a:buChar char="•"/>
+            </a:pPr>
+            <a:endParaRPr lang="en-GB" sz="2000" dirty="0"/>
+          </a:p>
+          <a:p>
+            <a:r>
+              <a:rPr lang="en-GB" sz="2000" dirty="0"/>
+              <a:t>2 teams: red &amp; green</a:t>
+            </a:r>
+          </a:p>
+          <a:p>
+            <a:pPr marL="342900" indent="-342900">
+              <a:buFont typeface="Arial" panose="020B0604020202020204" pitchFamily="34" charset="0"/>
+              <a:buChar char="•"/>
+            </a:pPr>
+            <a:endParaRPr lang="en-GB" sz="2000" dirty="0"/>
+          </a:p>
+          <a:p>
+            <a:r>
+              <a:rPr lang="en-GB" sz="2000" dirty="0"/>
+              <a:t>2 dev servers</a:t>
+            </a:r>
+          </a:p>
+          <a:p>
+            <a:r>
+              <a:rPr lang="en-GB" sz="2000" dirty="0"/>
+              <a:t>2 test server</a:t>
+            </a:r>
+          </a:p>
+          <a:p>
+            <a:r>
+              <a:rPr lang="en-GB" sz="2000" dirty="0"/>
+              <a:t>1 prod server </a:t>
+            </a:r>
+          </a:p>
+          <a:p>
+            <a:r>
+              <a:rPr lang="en-GB" sz="2000" dirty="0"/>
+              <a:t>   (still accessible to </a:t>
+            </a:r>
+            <a:r>
+              <a:rPr lang="en-GB" sz="2000" dirty="0" err="1"/>
+              <a:t>devs</a:t>
+            </a:r>
+            <a:r>
+              <a:rPr lang="en-GB" sz="2000" dirty="0"/>
+              <a:t>)</a:t>
+            </a:r>
+          </a:p>
+          <a:p>
+            <a:pPr marL="342900" indent="-342900">
+              <a:buFont typeface="Arial" panose="020B0604020202020204" pitchFamily="34" charset="0"/>
+              <a:buChar char="•"/>
+            </a:pPr>
+            <a:endParaRPr lang="en-GB" sz="2000" dirty="0"/>
+          </a:p>
+          <a:p>
+            <a:r>
+              <a:rPr lang="en-GB" sz="2000" dirty="0"/>
+              <a:t>1 source control</a:t>
+            </a:r>
+          </a:p>
+          <a:p>
+            <a:pPr marL="342900" indent="-342900">
+              <a:buFont typeface="Arial" panose="020B0604020202020204" pitchFamily="34" charset="0"/>
+              <a:buChar char="•"/>
+            </a:pPr>
+            <a:endParaRPr lang="en-GB" sz="2000" dirty="0"/>
+          </a:p>
+        </p:txBody>
+      </p:sp>
+      <p:sp>
+        <p:nvSpPr>
+          <p:cNvPr id="30" name="Arrow: Up 29">
+            <a:extLst>
+              <a:ext uri="{FF2B5EF4-FFF2-40B4-BE49-F238E27FC236}">
+                <a16:creationId xmlns:a16="http://schemas.microsoft.com/office/drawing/2014/main" id="{0104FFDB-1F58-4F47-949E-E0F9C14441C6}"/>
+              </a:ext>
+            </a:extLst>
+          </p:cNvPr>
+          <p:cNvSpPr/>
+          <p:nvPr/>
+        </p:nvSpPr>
+        <p:spPr>
+          <a:xfrm>
+            <a:off x="4950636" y="2924294"/>
+            <a:ext cx="209550" cy="222123"/>
+          </a:xfrm>
+          <a:prstGeom prst="upArrow">
+            <a:avLst/>
+          </a:prstGeom>
+          <a:solidFill>
+            <a:srgbClr val="FF0000"/>
+          </a:solidFill>
+          <a:ln>
+            <a:noFill/>
+          </a:ln>
+        </p:spPr>
+        <p:style>
+          <a:lnRef idx="2">
+            <a:schemeClr val="accent1">
+              <a:shade val="50000"/>
+            </a:schemeClr>
+          </a:lnRef>
+          <a:fillRef idx="1">
+            <a:schemeClr val="accent1"/>
+          </a:fillRef>
+          <a:effectRef idx="0">
+            <a:schemeClr val="accent1"/>
+          </a:effectRef>
+          <a:fontRef idx="minor">
+            <a:schemeClr val="lt1"/>
+          </a:fontRef>
+        </p:style>
+        <p:txBody>
+          <a:bodyPr rtlCol="0" anchor="ctr"/>
+          <a:lstStyle/>
+          <a:p>
+            <a:pPr algn="ctr"/>
+            <a:endParaRPr lang="en-GB"/>
+          </a:p>
+        </p:txBody>
+      </p:sp>
+      <p:sp>
+        <p:nvSpPr>
+          <p:cNvPr id="37" name="Rectangle 36">
+            <a:extLst>
+              <a:ext uri="{FF2B5EF4-FFF2-40B4-BE49-F238E27FC236}">
+                <a16:creationId xmlns:a16="http://schemas.microsoft.com/office/drawing/2014/main" id="{D437877E-9A7B-4B80-A91B-3EB94FC37399}"/>
+              </a:ext>
+            </a:extLst>
+          </p:cNvPr>
+          <p:cNvSpPr/>
+          <p:nvPr/>
+        </p:nvSpPr>
+        <p:spPr>
+          <a:xfrm flipH="1">
+            <a:off x="6441569" y="789099"/>
+            <a:ext cx="163892" cy="238083"/>
+          </a:xfrm>
+          <a:prstGeom prst="rect">
+            <a:avLst/>
+          </a:prstGeom>
+          <a:solidFill>
+            <a:schemeClr val="accent6"/>
+          </a:solidFill>
+          <a:ln>
+            <a:noFill/>
+          </a:ln>
+        </p:spPr>
+        <p:style>
+          <a:lnRef idx="2">
+            <a:schemeClr val="accent1">
+              <a:shade val="50000"/>
+            </a:schemeClr>
+          </a:lnRef>
+          <a:fillRef idx="1">
+            <a:schemeClr val="accent1"/>
+          </a:fillRef>
+          <a:effectRef idx="0">
+            <a:schemeClr val="accent1"/>
+          </a:effectRef>
+          <a:fontRef idx="minor">
+            <a:schemeClr val="lt1"/>
+          </a:fontRef>
+        </p:style>
+        <p:txBody>
+          <a:bodyPr rtlCol="0" anchor="ctr"/>
+          <a:lstStyle/>
+          <a:p>
+            <a:pPr algn="ctr"/>
+            <a:endParaRPr lang="en-GB"/>
+          </a:p>
+        </p:txBody>
+      </p:sp>
+      <p:sp>
+        <p:nvSpPr>
+          <p:cNvPr id="44" name="Arrow: Up 43">
+            <a:extLst>
+              <a:ext uri="{FF2B5EF4-FFF2-40B4-BE49-F238E27FC236}">
+                <a16:creationId xmlns:a16="http://schemas.microsoft.com/office/drawing/2014/main" id="{FB18C0AB-3CF6-4038-BBD1-1D0380B1C3FA}"/>
+              </a:ext>
+            </a:extLst>
+          </p:cNvPr>
+          <p:cNvSpPr/>
+          <p:nvPr/>
+        </p:nvSpPr>
+        <p:spPr>
+          <a:xfrm>
+            <a:off x="4966406" y="1773418"/>
+            <a:ext cx="209550" cy="222123"/>
+          </a:xfrm>
+          <a:prstGeom prst="upArrow">
+            <a:avLst/>
+          </a:prstGeom>
+          <a:solidFill>
+            <a:srgbClr val="FF0000"/>
+          </a:solidFill>
+          <a:ln>
+            <a:noFill/>
+          </a:ln>
+        </p:spPr>
+        <p:style>
+          <a:lnRef idx="2">
+            <a:schemeClr val="accent1">
+              <a:shade val="50000"/>
+            </a:schemeClr>
+          </a:lnRef>
+          <a:fillRef idx="1">
+            <a:schemeClr val="accent1"/>
+          </a:fillRef>
+          <a:effectRef idx="0">
+            <a:schemeClr val="accent1"/>
+          </a:effectRef>
+          <a:fontRef idx="minor">
+            <a:schemeClr val="lt1"/>
+          </a:fontRef>
+        </p:style>
+        <p:txBody>
+          <a:bodyPr rtlCol="0" anchor="ctr"/>
+          <a:lstStyle/>
+          <a:p>
+            <a:pPr algn="ctr"/>
+            <a:endParaRPr lang="en-GB"/>
+          </a:p>
+        </p:txBody>
+      </p:sp>
       <p:pic>
         <p:nvPicPr>
           <p:cNvPr id="2" name="Picture 2" descr="https://www.shareicon.net/data/512x512/2015/11/13/671415_sound_512x512.png">
@@ -31595,6 +31913,203 @@
   <p:clrMapOvr>
     <a:masterClrMapping/>
   </p:clrMapOvr>
+  <p:timing>
+    <p:tnLst>
+      <p:par>
+        <p:cTn id="1" dur="indefinite" restart="never" nodeType="tmRoot">
+          <p:childTnLst>
+            <p:seq concurrent="1" nextAc="seek">
+              <p:cTn id="2" dur="indefinite" nodeType="mainSeq">
+                <p:childTnLst>
+                  <p:par>
+                    <p:cTn id="3" fill="hold">
+                      <p:stCondLst>
+                        <p:cond delay="indefinite"/>
+                      </p:stCondLst>
+                      <p:childTnLst>
+                        <p:par>
+                          <p:cTn id="4" fill="hold">
+                            <p:stCondLst>
+                              <p:cond delay="0"/>
+                            </p:stCondLst>
+                            <p:childTnLst>
+                              <p:par>
+                                <p:cTn id="5" presetID="1" presetClass="entr" presetSubtype="0" fill="hold" grpId="0" nodeType="clickEffect">
+                                  <p:stCondLst>
+                                    <p:cond delay="0"/>
+                                  </p:stCondLst>
+                                  <p:childTnLst>
+                                    <p:set>
+                                      <p:cBhvr>
+                                        <p:cTn id="6" dur="1" fill="hold">
+                                          <p:stCondLst>
+                                            <p:cond delay="0"/>
+                                          </p:stCondLst>
+                                        </p:cTn>
+                                        <p:tgtEl>
+                                          <p:spTgt spid="48"/>
+                                        </p:tgtEl>
+                                        <p:attrNameLst>
+                                          <p:attrName>style.visibility</p:attrName>
+                                        </p:attrNameLst>
+                                      </p:cBhvr>
+                                      <p:to>
+                                        <p:strVal val="visible"/>
+                                      </p:to>
+                                    </p:set>
+                                  </p:childTnLst>
+                                </p:cTn>
+                              </p:par>
+                            </p:childTnLst>
+                          </p:cTn>
+                        </p:par>
+                      </p:childTnLst>
+                    </p:cTn>
+                  </p:par>
+                  <p:par>
+                    <p:cTn id="7" fill="hold">
+                      <p:stCondLst>
+                        <p:cond delay="indefinite"/>
+                      </p:stCondLst>
+                      <p:childTnLst>
+                        <p:par>
+                          <p:cTn id="8" fill="hold">
+                            <p:stCondLst>
+                              <p:cond delay="0"/>
+                            </p:stCondLst>
+                            <p:childTnLst>
+                              <p:par>
+                                <p:cTn id="9" presetID="1" presetClass="entr" presetSubtype="0" fill="hold" grpId="0" nodeType="clickEffect">
+                                  <p:stCondLst>
+                                    <p:cond delay="0"/>
+                                  </p:stCondLst>
+                                  <p:childTnLst>
+                                    <p:set>
+                                      <p:cBhvr>
+                                        <p:cTn id="10" dur="1" fill="hold">
+                                          <p:stCondLst>
+                                            <p:cond delay="0"/>
+                                          </p:stCondLst>
+                                        </p:cTn>
+                                        <p:tgtEl>
+                                          <p:spTgt spid="49"/>
+                                        </p:tgtEl>
+                                        <p:attrNameLst>
+                                          <p:attrName>style.visibility</p:attrName>
+                                        </p:attrNameLst>
+                                      </p:cBhvr>
+                                      <p:to>
+                                        <p:strVal val="visible"/>
+                                      </p:to>
+                                    </p:set>
+                                  </p:childTnLst>
+                                </p:cTn>
+                              </p:par>
+                            </p:childTnLst>
+                          </p:cTn>
+                        </p:par>
+                      </p:childTnLst>
+                    </p:cTn>
+                  </p:par>
+                  <p:par>
+                    <p:cTn id="11" fill="hold">
+                      <p:stCondLst>
+                        <p:cond delay="indefinite"/>
+                      </p:stCondLst>
+                      <p:childTnLst>
+                        <p:par>
+                          <p:cTn id="12" fill="hold">
+                            <p:stCondLst>
+                              <p:cond delay="0"/>
+                            </p:stCondLst>
+                            <p:childTnLst>
+                              <p:par>
+                                <p:cTn id="13" presetID="1" presetClass="entr" presetSubtype="0" fill="hold" nodeType="clickEffect">
+                                  <p:stCondLst>
+                                    <p:cond delay="0"/>
+                                  </p:stCondLst>
+                                  <p:childTnLst>
+                                    <p:set>
+                                      <p:cBhvr>
+                                        <p:cTn id="14" dur="1" fill="hold">
+                                          <p:stCondLst>
+                                            <p:cond delay="0"/>
+                                          </p:stCondLst>
+                                        </p:cTn>
+                                        <p:tgtEl>
+                                          <p:spTgt spid="2"/>
+                                        </p:tgtEl>
+                                        <p:attrNameLst>
+                                          <p:attrName>style.visibility</p:attrName>
+                                        </p:attrNameLst>
+                                      </p:cBhvr>
+                                      <p:to>
+                                        <p:strVal val="visible"/>
+                                      </p:to>
+                                    </p:set>
+                                  </p:childTnLst>
+                                </p:cTn>
+                              </p:par>
+                              <p:par>
+                                <p:cTn id="15" presetID="1" presetClass="entr" presetSubtype="0" fill="hold" grpId="0" nodeType="withEffect">
+                                  <p:stCondLst>
+                                    <p:cond delay="0"/>
+                                  </p:stCondLst>
+                                  <p:childTnLst>
+                                    <p:set>
+                                      <p:cBhvr>
+                                        <p:cTn id="16" dur="1" fill="hold">
+                                          <p:stCondLst>
+                                            <p:cond delay="0"/>
+                                          </p:stCondLst>
+                                        </p:cTn>
+                                        <p:tgtEl>
+                                          <p:spTgt spid="50"/>
+                                        </p:tgtEl>
+                                        <p:attrNameLst>
+                                          <p:attrName>style.visibility</p:attrName>
+                                        </p:attrNameLst>
+                                      </p:cBhvr>
+                                      <p:to>
+                                        <p:strVal val="visible"/>
+                                      </p:to>
+                                    </p:set>
+                                  </p:childTnLst>
+                                </p:cTn>
+                              </p:par>
+                            </p:childTnLst>
+                          </p:cTn>
+                        </p:par>
+                      </p:childTnLst>
+                    </p:cTn>
+                  </p:par>
+                </p:childTnLst>
+              </p:cTn>
+              <p:prevCondLst>
+                <p:cond evt="onPrev" delay="0">
+                  <p:tgtEl>
+                    <p:sldTgt/>
+                  </p:tgtEl>
+                </p:cond>
+              </p:prevCondLst>
+              <p:nextCondLst>
+                <p:cond evt="onNext" delay="0">
+                  <p:tgtEl>
+                    <p:sldTgt/>
+                  </p:tgtEl>
+                </p:cond>
+              </p:nextCondLst>
+            </p:seq>
+          </p:childTnLst>
+        </p:cTn>
+      </p:par>
+    </p:tnLst>
+    <p:bldLst>
+      <p:bldP spid="48" grpId="0" animBg="1"/>
+      <p:bldP spid="49" grpId="0" animBg="1"/>
+      <p:bldP spid="50" grpId="0" animBg="1"/>
+    </p:bldLst>
+  </p:timing>
 </p:sld>
 </file>
 

</xml_diff>